<commit_message>
table in classroom example added
</commit_message>
<xml_diff>
--- a/presentation/Modeling Pedestrian Flow in a Crowded Building.pptx
+++ b/presentation/Modeling Pedestrian Flow in a Crowded Building.pptx
@@ -5,7 +5,7 @@
     <p:sldMasterId id="2147483648" r:id="rId4"/>
   </p:sldMasterIdLst>
   <p:notesMasterIdLst>
-    <p:notesMasterId r:id="rId25"/>
+    <p:notesMasterId r:id="rId26"/>
   </p:notesMasterIdLst>
   <p:sldIdLst>
     <p:sldId id="256" r:id="rId5"/>
@@ -23,11 +23,12 @@
     <p:sldId id="275" r:id="rId17"/>
     <p:sldId id="273" r:id="rId18"/>
     <p:sldId id="276" r:id="rId19"/>
-    <p:sldId id="278" r:id="rId20"/>
-    <p:sldId id="262" r:id="rId21"/>
-    <p:sldId id="279" r:id="rId22"/>
-    <p:sldId id="277" r:id="rId23"/>
-    <p:sldId id="280" r:id="rId24"/>
+    <p:sldId id="283" r:id="rId20"/>
+    <p:sldId id="278" r:id="rId21"/>
+    <p:sldId id="262" r:id="rId22"/>
+    <p:sldId id="279" r:id="rId23"/>
+    <p:sldId id="277" r:id="rId24"/>
+    <p:sldId id="280" r:id="rId25"/>
   </p:sldIdLst>
   <p:sldSz cx="12192000" cy="6858000"/>
   <p:notesSz cx="6858000" cy="9144000"/>
@@ -263,7 +264,7 @@
           <a:p>
             <a:fld id="{3D2F732A-3C70-4300-993F-4746D7AE1204}" type="datetimeFigureOut">
               <a:rPr lang="en-GB" smtClean="0"/>
-              <a:t>05/12/2021</a:t>
+              <a:t>06/12/2021</a:t>
             </a:fld>
             <a:endParaRPr lang="en-GB"/>
           </a:p>
@@ -600,7 +601,7 @@
           <a:p>
             <a:fld id="{5C4073D9-20D0-4390-B5DB-97F27F405CA0}" type="slidenum">
               <a:rPr lang="en-GB" smtClean="0"/>
-              <a:t>17</a:t>
+              <a:t>18</a:t>
             </a:fld>
             <a:endParaRPr lang="en-GB"/>
           </a:p>
@@ -768,7 +769,7 @@
           <a:p>
             <a:fld id="{9C41D321-80A6-4E23-B2D4-E355D273CE20}" type="datetimeFigureOut">
               <a:rPr lang="de-CH" smtClean="0"/>
-              <a:t>05.12.2021</a:t>
+              <a:t>06.12.2021</a:t>
             </a:fld>
             <a:endParaRPr lang="de-CH"/>
           </a:p>
@@ -968,7 +969,7 @@
           <a:p>
             <a:fld id="{9C41D321-80A6-4E23-B2D4-E355D273CE20}" type="datetimeFigureOut">
               <a:rPr lang="de-CH" smtClean="0"/>
-              <a:t>05.12.2021</a:t>
+              <a:t>06.12.2021</a:t>
             </a:fld>
             <a:endParaRPr lang="de-CH"/>
           </a:p>
@@ -1178,7 +1179,7 @@
           <a:p>
             <a:fld id="{9C41D321-80A6-4E23-B2D4-E355D273CE20}" type="datetimeFigureOut">
               <a:rPr lang="de-CH" smtClean="0"/>
-              <a:t>05.12.2021</a:t>
+              <a:t>06.12.2021</a:t>
             </a:fld>
             <a:endParaRPr lang="de-CH"/>
           </a:p>
@@ -1378,7 +1379,7 @@
           <a:p>
             <a:fld id="{9C41D321-80A6-4E23-B2D4-E355D273CE20}" type="datetimeFigureOut">
               <a:rPr lang="de-CH" smtClean="0"/>
-              <a:t>05.12.2021</a:t>
+              <a:t>06.12.2021</a:t>
             </a:fld>
             <a:endParaRPr lang="de-CH"/>
           </a:p>
@@ -1654,7 +1655,7 @@
           <a:p>
             <a:fld id="{9C41D321-80A6-4E23-B2D4-E355D273CE20}" type="datetimeFigureOut">
               <a:rPr lang="de-CH" smtClean="0"/>
-              <a:t>05.12.2021</a:t>
+              <a:t>06.12.2021</a:t>
             </a:fld>
             <a:endParaRPr lang="de-CH"/>
           </a:p>
@@ -1922,7 +1923,7 @@
           <a:p>
             <a:fld id="{9C41D321-80A6-4E23-B2D4-E355D273CE20}" type="datetimeFigureOut">
               <a:rPr lang="de-CH" smtClean="0"/>
-              <a:t>05.12.2021</a:t>
+              <a:t>06.12.2021</a:t>
             </a:fld>
             <a:endParaRPr lang="de-CH"/>
           </a:p>
@@ -2337,7 +2338,7 @@
           <a:p>
             <a:fld id="{9C41D321-80A6-4E23-B2D4-E355D273CE20}" type="datetimeFigureOut">
               <a:rPr lang="de-CH" smtClean="0"/>
-              <a:t>05.12.2021</a:t>
+              <a:t>06.12.2021</a:t>
             </a:fld>
             <a:endParaRPr lang="de-CH"/>
           </a:p>
@@ -2479,7 +2480,7 @@
           <a:p>
             <a:fld id="{9C41D321-80A6-4E23-B2D4-E355D273CE20}" type="datetimeFigureOut">
               <a:rPr lang="de-CH" smtClean="0"/>
-              <a:t>05.12.2021</a:t>
+              <a:t>06.12.2021</a:t>
             </a:fld>
             <a:endParaRPr lang="de-CH"/>
           </a:p>
@@ -2592,7 +2593,7 @@
           <a:p>
             <a:fld id="{9C41D321-80A6-4E23-B2D4-E355D273CE20}" type="datetimeFigureOut">
               <a:rPr lang="de-CH" smtClean="0"/>
-              <a:t>05.12.2021</a:t>
+              <a:t>06.12.2021</a:t>
             </a:fld>
             <a:endParaRPr lang="de-CH"/>
           </a:p>
@@ -2905,7 +2906,7 @@
           <a:p>
             <a:fld id="{9C41D321-80A6-4E23-B2D4-E355D273CE20}" type="datetimeFigureOut">
               <a:rPr lang="de-CH" smtClean="0"/>
-              <a:t>05.12.2021</a:t>
+              <a:t>06.12.2021</a:t>
             </a:fld>
             <a:endParaRPr lang="de-CH"/>
           </a:p>
@@ -3194,7 +3195,7 @@
           <a:p>
             <a:fld id="{9C41D321-80A6-4E23-B2D4-E355D273CE20}" type="datetimeFigureOut">
               <a:rPr lang="de-CH" smtClean="0"/>
-              <a:t>05.12.2021</a:t>
+              <a:t>06.12.2021</a:t>
             </a:fld>
             <a:endParaRPr lang="de-CH"/>
           </a:p>
@@ -3437,7 +3438,7 @@
           <a:p>
             <a:fld id="{9C41D321-80A6-4E23-B2D4-E355D273CE20}" type="datetimeFigureOut">
               <a:rPr lang="de-CH" smtClean="0"/>
-              <a:t>05.12.2021</a:t>
+              <a:t>06.12.2021</a:t>
             </a:fld>
             <a:endParaRPr lang="de-CH"/>
           </a:p>
@@ -5153,13 +5154,13 @@
   <p:clrMapOvr>
     <a:masterClrMapping/>
   </p:clrMapOvr>
-  <mc:AlternateContent xmlns:mc="http://schemas.openxmlformats.org/markup-compatibility/2006">
-    <mc:Choice xmlns:p159="http://schemas.microsoft.com/office/powerpoint/2015/09/main" Requires="p159">
+  <mc:AlternateContent xmlns:mc="http://schemas.openxmlformats.org/markup-compatibility/2006" xmlns:p159="http://schemas.microsoft.com/office/powerpoint/2015/09/main">
+    <mc:Choice Requires="p159">
       <p:transition spd="slow">
         <p159:morph option="byObject"/>
       </p:transition>
     </mc:Choice>
-    <mc:Fallback>
+    <mc:Fallback xmlns="">
       <p:transition spd="slow">
         <p:fade/>
       </p:transition>
@@ -6209,13 +6210,13 @@
   <p:clrMapOvr>
     <a:masterClrMapping/>
   </p:clrMapOvr>
-  <mc:AlternateContent xmlns:mc="http://schemas.openxmlformats.org/markup-compatibility/2006">
-    <mc:Choice xmlns:p14="http://schemas.microsoft.com/office/powerpoint/2010/main" Requires="p14">
+  <mc:AlternateContent xmlns:mc="http://schemas.openxmlformats.org/markup-compatibility/2006" xmlns:p14="http://schemas.microsoft.com/office/powerpoint/2010/main">
+    <mc:Choice Requires="p14">
       <p:transition spd="med" p14:dur="700">
         <p:fade/>
       </p:transition>
     </mc:Choice>
-    <mc:Fallback>
+    <mc:Fallback xmlns="">
       <p:transition spd="med">
         <p:fade/>
       </p:transition>
@@ -6281,13 +6282,13 @@
   <p:clrMapOvr>
     <a:masterClrMapping/>
   </p:clrMapOvr>
-  <mc:AlternateContent xmlns:mc="http://schemas.openxmlformats.org/markup-compatibility/2006">
-    <mc:Choice xmlns:p159="http://schemas.microsoft.com/office/powerpoint/2015/09/main" Requires="p159">
+  <mc:AlternateContent xmlns:mc="http://schemas.openxmlformats.org/markup-compatibility/2006" xmlns:p159="http://schemas.microsoft.com/office/powerpoint/2015/09/main">
+    <mc:Choice Requires="p159">
       <p:transition spd="slow">
         <p159:morph option="byObject"/>
       </p:transition>
     </mc:Choice>
-    <mc:Fallback>
+    <mc:Fallback xmlns="">
       <p:transition spd="slow">
         <p:fade/>
       </p:transition>
@@ -7502,13 +7503,13 @@
   <p:clrMapOvr>
     <a:masterClrMapping/>
   </p:clrMapOvr>
-  <mc:AlternateContent xmlns:mc="http://schemas.openxmlformats.org/markup-compatibility/2006">
-    <mc:Choice xmlns:p159="http://schemas.microsoft.com/office/powerpoint/2015/09/main" Requires="p159">
+  <mc:AlternateContent xmlns:mc="http://schemas.openxmlformats.org/markup-compatibility/2006" xmlns:p159="http://schemas.microsoft.com/office/powerpoint/2015/09/main">
+    <mc:Choice Requires="p159">
       <p:transition spd="slow">
         <p159:morph option="byObject"/>
       </p:transition>
     </mc:Choice>
-    <mc:Fallback>
+    <mc:Fallback xmlns="">
       <p:transition spd="slow">
         <p:fade/>
       </p:transition>
@@ -7853,6 +7854,478 @@
   <p:clrMapOvr>
     <a:masterClrMapping/>
   </p:clrMapOvr>
+  <mc:AlternateContent xmlns:mc="http://schemas.openxmlformats.org/markup-compatibility/2006" xmlns:p159="http://schemas.microsoft.com/office/powerpoint/2015/09/main">
+    <mc:Choice Requires="p159">
+      <p:transition spd="slow">
+        <p159:morph option="byObject"/>
+      </p:transition>
+    </mc:Choice>
+    <mc:Fallback xmlns="">
+      <p:transition spd="slow">
+        <p:fade/>
+      </p:transition>
+    </mc:Fallback>
+  </mc:AlternateContent>
+</p:sld>
+</file>
+
+<file path=ppt/slides/slide16.xml><?xml version="1.0" encoding="utf-8"?>
+<p:sld xmlns:a="http://schemas.openxmlformats.org/drawingml/2006/main" xmlns:r="http://schemas.openxmlformats.org/officeDocument/2006/relationships" xmlns:p="http://schemas.openxmlformats.org/presentationml/2006/main">
+  <p:cSld>
+    <p:bg>
+      <p:bgPr>
+        <a:solidFill>
+          <a:schemeClr val="bg1"/>
+        </a:solidFill>
+        <a:effectLst/>
+      </p:bgPr>
+    </p:bg>
+    <p:spTree>
+      <p:nvGrpSpPr>
+        <p:cNvPr id="1" name=""/>
+        <p:cNvGrpSpPr/>
+        <p:nvPr/>
+      </p:nvGrpSpPr>
+      <p:grpSpPr>
+        <a:xfrm>
+          <a:off x="0" y="0"/>
+          <a:ext cx="0" cy="0"/>
+          <a:chOff x="0" y="0"/>
+          <a:chExt cx="0" cy="0"/>
+        </a:xfrm>
+      </p:grpSpPr>
+      <p:sp>
+        <p:nvSpPr>
+          <p:cNvPr id="3" name="AutoShape 2">
+            <a:extLst>
+              <a:ext uri="{FF2B5EF4-FFF2-40B4-BE49-F238E27FC236}">
+                <a16:creationId xmlns:a16="http://schemas.microsoft.com/office/drawing/2014/main" id="{53BF53F9-480B-459A-A04E-5D6235178011}"/>
+              </a:ext>
+            </a:extLst>
+          </p:cNvPr>
+          <p:cNvSpPr>
+            <a:spLocks noGrp="1" noChangeAspect="1" noChangeArrowheads="1"/>
+          </p:cNvSpPr>
+          <p:nvPr>
+            <p:ph type="title" idx="4294967295"/>
+          </p:nvPr>
+        </p:nvSpPr>
+        <p:spPr bwMode="auto">
+          <a:xfrm>
+            <a:off x="733425" y="631825"/>
+            <a:ext cx="5130800" cy="1462088"/>
+          </a:xfrm>
+          <a:prstGeom prst="rect">
+            <a:avLst/>
+          </a:prstGeom>
+          <a:noFill/>
+          <a:extLst>
+            <a:ext uri="{909E8E84-426E-40DD-AFC4-6F175D3DCCD1}">
+              <a14:hiddenFill xmlns:a14="http://schemas.microsoft.com/office/drawing/2010/main">
+                <a:solidFill>
+                  <a:srgbClr val="FFFFFF"/>
+                </a:solidFill>
+              </a14:hiddenFill>
+            </a:ext>
+          </a:extLst>
+        </p:spPr>
+        <p:txBody>
+          <a:bodyPr vert="horz" wrap="square" lIns="91440" tIns="45720" rIns="91440" bIns="45720" numCol="1" anchor="t" anchorCtr="0" compatLnSpc="1">
+            <a:prstTxWarp prst="textNoShape">
+              <a:avLst/>
+            </a:prstTxWarp>
+          </a:bodyPr>
+          <a:lstStyle/>
+          <a:p>
+            <a:r>
+              <a:rPr lang="en-US" sz="4400"/>
+              <a:t>Example:</a:t>
+            </a:r>
+            <a:br>
+              <a:rPr lang="en-US" sz="4400"/>
+            </a:br>
+            <a:r>
+              <a:rPr lang="en-US" sz="4400"/>
+              <a:t>Classroom</a:t>
+            </a:r>
+            <a:endParaRPr lang="en-GB"/>
+          </a:p>
+        </p:txBody>
+      </p:sp>
+      <p:pic>
+        <p:nvPicPr>
+          <p:cNvPr id="5" name="Grafik 4">
+            <a:extLst>
+              <a:ext uri="{FF2B5EF4-FFF2-40B4-BE49-F238E27FC236}">
+                <a16:creationId xmlns:a16="http://schemas.microsoft.com/office/drawing/2014/main" id="{421CFDBC-5952-474F-ACE7-4102D9FA29BE}"/>
+              </a:ext>
+            </a:extLst>
+          </p:cNvPr>
+          <p:cNvPicPr>
+            <a:picLocks noChangeAspect="1"/>
+          </p:cNvPicPr>
+          <p:nvPr/>
+        </p:nvPicPr>
+        <p:blipFill>
+          <a:blip r:embed="rId2">
+            <a:extLst>
+              <a:ext uri="{28A0092B-C50C-407E-A947-70E740481C1C}">
+                <a14:useLocalDpi xmlns:a14="http://schemas.microsoft.com/office/drawing/2010/main" val="0"/>
+              </a:ext>
+            </a:extLst>
+          </a:blip>
+          <a:stretch>
+            <a:fillRect/>
+          </a:stretch>
+        </p:blipFill>
+        <p:spPr>
+          <a:xfrm>
+            <a:off x="146050" y="2497138"/>
+            <a:ext cx="3952875" cy="3954463"/>
+          </a:xfrm>
+          <a:prstGeom prst="rect">
+            <a:avLst/>
+          </a:prstGeom>
+        </p:spPr>
+      </p:pic>
+      <p:pic>
+        <p:nvPicPr>
+          <p:cNvPr id="7" name="Grafik 6">
+            <a:extLst>
+              <a:ext uri="{FF2B5EF4-FFF2-40B4-BE49-F238E27FC236}">
+                <a16:creationId xmlns:a16="http://schemas.microsoft.com/office/drawing/2014/main" id="{FC80C5D5-8235-43F7-AC83-1341C6F4C648}"/>
+              </a:ext>
+            </a:extLst>
+          </p:cNvPr>
+          <p:cNvPicPr>
+            <a:picLocks noChangeAspect="1"/>
+          </p:cNvPicPr>
+          <p:nvPr/>
+        </p:nvPicPr>
+        <p:blipFill>
+          <a:blip r:embed="rId3">
+            <a:extLst>
+              <a:ext uri="{28A0092B-C50C-407E-A947-70E740481C1C}">
+                <a14:useLocalDpi xmlns:a14="http://schemas.microsoft.com/office/drawing/2010/main" val="0"/>
+              </a:ext>
+            </a:extLst>
+          </a:blip>
+          <a:stretch>
+            <a:fillRect/>
+          </a:stretch>
+        </p:blipFill>
+        <p:spPr>
+          <a:xfrm>
+            <a:off x="7735888" y="2497138"/>
+            <a:ext cx="3952875" cy="3954463"/>
+          </a:xfrm>
+          <a:prstGeom prst="rect">
+            <a:avLst/>
+          </a:prstGeom>
+        </p:spPr>
+      </p:pic>
+      <p:pic>
+        <p:nvPicPr>
+          <p:cNvPr id="11" name="Grafik 10">
+            <a:extLst>
+              <a:ext uri="{FF2B5EF4-FFF2-40B4-BE49-F238E27FC236}">
+                <a16:creationId xmlns:a16="http://schemas.microsoft.com/office/drawing/2014/main" id="{5F0D753C-5479-4CFD-B4CA-62A7F95410A1}"/>
+              </a:ext>
+            </a:extLst>
+          </p:cNvPr>
+          <p:cNvPicPr>
+            <a:picLocks noChangeAspect="1"/>
+          </p:cNvPicPr>
+          <p:nvPr/>
+        </p:nvPicPr>
+        <p:blipFill>
+          <a:blip r:embed="rId4">
+            <a:extLst>
+              <a:ext uri="{28A0092B-C50C-407E-A947-70E740481C1C}">
+                <a14:useLocalDpi xmlns:a14="http://schemas.microsoft.com/office/drawing/2010/main" val="0"/>
+              </a:ext>
+            </a:extLst>
+          </a:blip>
+          <a:stretch>
+            <a:fillRect/>
+          </a:stretch>
+        </p:blipFill>
+        <p:spPr>
+          <a:xfrm>
+            <a:off x="3940175" y="2497138"/>
+            <a:ext cx="3954463" cy="3954463"/>
+          </a:xfrm>
+          <a:prstGeom prst="rect">
+            <a:avLst/>
+          </a:prstGeom>
+        </p:spPr>
+      </p:pic>
+      <p:graphicFrame>
+        <p:nvGraphicFramePr>
+          <p:cNvPr id="2" name="Tabelle 3">
+            <a:extLst>
+              <a:ext uri="{FF2B5EF4-FFF2-40B4-BE49-F238E27FC236}">
+                <a16:creationId xmlns:a16="http://schemas.microsoft.com/office/drawing/2014/main" id="{2485A9A7-5FC2-471C-8C12-427A2A250663}"/>
+              </a:ext>
+            </a:extLst>
+          </p:cNvPr>
+          <p:cNvGraphicFramePr>
+            <a:graphicFrameLocks noGrp="1"/>
+          </p:cNvGraphicFramePr>
+          <p:nvPr>
+            <p:extLst>
+              <p:ext uri="{D42A27DB-BD31-4B8C-83A1-F6EECF244321}">
+                <p14:modId xmlns:p14="http://schemas.microsoft.com/office/powerpoint/2010/main" val="3604333513"/>
+              </p:ext>
+            </p:extLst>
+          </p:nvPr>
+        </p:nvGraphicFramePr>
+        <p:xfrm>
+          <a:off x="5917406" y="610553"/>
+          <a:ext cx="5423613" cy="1483360"/>
+        </p:xfrm>
+        <a:graphic>
+          <a:graphicData uri="http://schemas.openxmlformats.org/drawingml/2006/table">
+            <a:tbl>
+              <a:tblPr firstRow="1" bandRow="1">
+                <a:tableStyleId>{93296810-A885-4BE3-A3E7-6D5BEEA58F35}</a:tableStyleId>
+              </a:tblPr>
+              <a:tblGrid>
+                <a:gridCol w="1807871">
+                  <a:extLst>
+                    <a:ext uri="{9D8B030D-6E8A-4147-A177-3AD203B41FA5}">
+                      <a16:colId xmlns:a16="http://schemas.microsoft.com/office/drawing/2014/main" val="2030632210"/>
+                    </a:ext>
+                  </a:extLst>
+                </a:gridCol>
+                <a:gridCol w="1807871">
+                  <a:extLst>
+                    <a:ext uri="{9D8B030D-6E8A-4147-A177-3AD203B41FA5}">
+                      <a16:colId xmlns:a16="http://schemas.microsoft.com/office/drawing/2014/main" val="2622660376"/>
+                    </a:ext>
+                  </a:extLst>
+                </a:gridCol>
+                <a:gridCol w="1807871">
+                  <a:extLst>
+                    <a:ext uri="{9D8B030D-6E8A-4147-A177-3AD203B41FA5}">
+                      <a16:colId xmlns:a16="http://schemas.microsoft.com/office/drawing/2014/main" val="2951212016"/>
+                    </a:ext>
+                  </a:extLst>
+                </a:gridCol>
+              </a:tblGrid>
+              <a:tr h="370840">
+                <a:tc>
+                  <a:txBody>
+                    <a:bodyPr/>
+                    <a:lstStyle/>
+                    <a:p>
+                      <a:r>
+                        <a:rPr lang="en-GB" dirty="0"/>
+                        <a:t>Configuration</a:t>
+                      </a:r>
+                    </a:p>
+                  </a:txBody>
+                  <a:tcPr/>
+                </a:tc>
+                <a:tc>
+                  <a:txBody>
+                    <a:bodyPr/>
+                    <a:lstStyle/>
+                    <a:p>
+                      <a:r>
+                        <a:rPr lang="en-GB" dirty="0"/>
+                        <a:t>&lt;t&gt; [s]</a:t>
+                      </a:r>
+                    </a:p>
+                  </a:txBody>
+                  <a:tcPr/>
+                </a:tc>
+                <a:tc>
+                  <a:txBody>
+                    <a:bodyPr/>
+                    <a:lstStyle/>
+                    <a:p>
+                      <a:r>
+                        <a:rPr lang="el-GR" sz="1800" b="0" kern="1200" dirty="0">
+                          <a:solidFill>
+                            <a:schemeClr val="lt1"/>
+                          </a:solidFill>
+                          <a:effectLst/>
+                        </a:rPr>
+                        <a:t>σ</a:t>
+                      </a:r>
+                      <a:r>
+                        <a:rPr lang="de-CH" sz="1800" b="0" kern="1200" dirty="0">
+                          <a:solidFill>
+                            <a:schemeClr val="lt1"/>
+                          </a:solidFill>
+                          <a:effectLst/>
+                        </a:rPr>
+                        <a:t> [s]</a:t>
+                      </a:r>
+                      <a:endParaRPr lang="en-GB" dirty="0"/>
+                    </a:p>
+                  </a:txBody>
+                  <a:tcPr/>
+                </a:tc>
+                <a:extLst>
+                  <a:ext uri="{0D108BD9-81ED-4DB2-BD59-A6C34878D82A}">
+                    <a16:rowId xmlns:a16="http://schemas.microsoft.com/office/drawing/2014/main" val="891547824"/>
+                  </a:ext>
+                </a:extLst>
+              </a:tr>
+              <a:tr h="370840">
+                <a:tc>
+                  <a:txBody>
+                    <a:bodyPr/>
+                    <a:lstStyle/>
+                    <a:p>
+                      <a:r>
+                        <a:rPr lang="en-GB" dirty="0"/>
+                        <a:t>Short Side</a:t>
+                      </a:r>
+                    </a:p>
+                  </a:txBody>
+                  <a:tcPr/>
+                </a:tc>
+                <a:tc>
+                  <a:txBody>
+                    <a:bodyPr/>
+                    <a:lstStyle/>
+                    <a:p>
+                      <a:r>
+                        <a:rPr lang="en-GB" dirty="0"/>
+                        <a:t>10.58</a:t>
+                      </a:r>
+                    </a:p>
+                  </a:txBody>
+                  <a:tcPr/>
+                </a:tc>
+                <a:tc>
+                  <a:txBody>
+                    <a:bodyPr/>
+                    <a:lstStyle/>
+                    <a:p>
+                      <a:r>
+                        <a:rPr lang="en-GB" dirty="0"/>
+                        <a:t>0.04</a:t>
+                      </a:r>
+                    </a:p>
+                  </a:txBody>
+                  <a:tcPr/>
+                </a:tc>
+                <a:extLst>
+                  <a:ext uri="{0D108BD9-81ED-4DB2-BD59-A6C34878D82A}">
+                    <a16:rowId xmlns:a16="http://schemas.microsoft.com/office/drawing/2014/main" val="2534727525"/>
+                  </a:ext>
+                </a:extLst>
+              </a:tr>
+              <a:tr h="370840">
+                <a:tc>
+                  <a:txBody>
+                    <a:bodyPr/>
+                    <a:lstStyle/>
+                    <a:p>
+                      <a:r>
+                        <a:rPr lang="en-GB" dirty="0"/>
+                        <a:t>Long Side</a:t>
+                      </a:r>
+                    </a:p>
+                  </a:txBody>
+                  <a:tcPr/>
+                </a:tc>
+                <a:tc>
+                  <a:txBody>
+                    <a:bodyPr/>
+                    <a:lstStyle/>
+                    <a:p>
+                      <a:r>
+                        <a:rPr lang="en-GB" dirty="0"/>
+                        <a:t>12.4</a:t>
+                      </a:r>
+                    </a:p>
+                  </a:txBody>
+                  <a:tcPr/>
+                </a:tc>
+                <a:tc>
+                  <a:txBody>
+                    <a:bodyPr/>
+                    <a:lstStyle/>
+                    <a:p>
+                      <a:r>
+                        <a:rPr lang="en-GB" dirty="0"/>
+                        <a:t>0.2</a:t>
+                      </a:r>
+                    </a:p>
+                  </a:txBody>
+                  <a:tcPr/>
+                </a:tc>
+                <a:extLst>
+                  <a:ext uri="{0D108BD9-81ED-4DB2-BD59-A6C34878D82A}">
+                    <a16:rowId xmlns:a16="http://schemas.microsoft.com/office/drawing/2014/main" val="1771661526"/>
+                  </a:ext>
+                </a:extLst>
+              </a:tr>
+              <a:tr h="370840">
+                <a:tc>
+                  <a:txBody>
+                    <a:bodyPr/>
+                    <a:lstStyle/>
+                    <a:p>
+                      <a:r>
+                        <a:rPr lang="en-GB" dirty="0"/>
+                        <a:t>U-Shape</a:t>
+                      </a:r>
+                    </a:p>
+                  </a:txBody>
+                  <a:tcPr/>
+                </a:tc>
+                <a:tc>
+                  <a:txBody>
+                    <a:bodyPr/>
+                    <a:lstStyle/>
+                    <a:p>
+                      <a:r>
+                        <a:rPr lang="en-GB" dirty="0"/>
+                        <a:t>8.5</a:t>
+                      </a:r>
+                    </a:p>
+                  </a:txBody>
+                  <a:tcPr/>
+                </a:tc>
+                <a:tc>
+                  <a:txBody>
+                    <a:bodyPr/>
+                    <a:lstStyle/>
+                    <a:p>
+                      <a:r>
+                        <a:rPr lang="en-GB" dirty="0"/>
+                        <a:t>0.1</a:t>
+                      </a:r>
+                    </a:p>
+                  </a:txBody>
+                  <a:tcPr/>
+                </a:tc>
+                <a:extLst>
+                  <a:ext uri="{0D108BD9-81ED-4DB2-BD59-A6C34878D82A}">
+                    <a16:rowId xmlns:a16="http://schemas.microsoft.com/office/drawing/2014/main" val="971421820"/>
+                  </a:ext>
+                </a:extLst>
+              </a:tr>
+            </a:tbl>
+          </a:graphicData>
+        </a:graphic>
+      </p:graphicFrame>
+    </p:spTree>
+    <p:extLst>
+      <p:ext uri="{BB962C8B-B14F-4D97-AF65-F5344CB8AC3E}">
+        <p14:creationId xmlns:p14="http://schemas.microsoft.com/office/powerpoint/2010/main" val="1024644036"/>
+      </p:ext>
+    </p:extLst>
+  </p:cSld>
+  <p:clrMapOvr>
+    <a:masterClrMapping/>
+  </p:clrMapOvr>
   <mc:AlternateContent xmlns:mc="http://schemas.openxmlformats.org/markup-compatibility/2006">
     <mc:Choice xmlns:p159="http://schemas.microsoft.com/office/powerpoint/2015/09/main" Requires="p159">
       <p:transition spd="slow">
@@ -7865,10 +8338,93 @@
       </p:transition>
     </mc:Fallback>
   </mc:AlternateContent>
+  <p:timing>
+    <p:tnLst>
+      <p:par>
+        <p:cTn id="1" dur="indefinite" restart="never" nodeType="tmRoot">
+          <p:childTnLst>
+            <p:seq concurrent="1" nextAc="seek">
+              <p:cTn id="2" dur="indefinite" nodeType="mainSeq">
+                <p:childTnLst>
+                  <p:par>
+                    <p:cTn id="3" fill="hold">
+                      <p:stCondLst>
+                        <p:cond delay="indefinite"/>
+                      </p:stCondLst>
+                      <p:childTnLst>
+                        <p:par>
+                          <p:cTn id="4" fill="hold">
+                            <p:stCondLst>
+                              <p:cond delay="0"/>
+                            </p:stCondLst>
+                            <p:childTnLst>
+                              <p:par>
+                                <p:cTn id="5" presetID="10" presetClass="entr" presetSubtype="0" fill="hold" nodeType="clickEffect">
+                                  <p:stCondLst>
+                                    <p:cond delay="0"/>
+                                  </p:stCondLst>
+                                  <p:childTnLst>
+                                    <p:set>
+                                      <p:cBhvr>
+                                        <p:cTn id="6" dur="1" fill="hold">
+                                          <p:stCondLst>
+                                            <p:cond delay="0"/>
+                                          </p:stCondLst>
+                                        </p:cTn>
+                                        <p:tgtEl>
+                                          <p:spTgt spid="2"/>
+                                        </p:tgtEl>
+                                        <p:attrNameLst>
+                                          <p:attrName>style.visibility</p:attrName>
+                                        </p:attrNameLst>
+                                      </p:cBhvr>
+                                      <p:to>
+                                        <p:strVal val="visible"/>
+                                      </p:to>
+                                    </p:set>
+                                    <p:animEffect transition="in" filter="fade">
+                                      <p:cBhvr>
+                                        <p:cTn id="7" dur="500"/>
+                                        <p:tgtEl>
+                                          <p:spTgt spid="2"/>
+                                        </p:tgtEl>
+                                      </p:cBhvr>
+                                    </p:animEffect>
+                                  </p:childTnLst>
+                                </p:cTn>
+                              </p:par>
+                            </p:childTnLst>
+                          </p:cTn>
+                        </p:par>
+                      </p:childTnLst>
+                    </p:cTn>
+                  </p:par>
+                </p:childTnLst>
+              </p:cTn>
+              <p:prevCondLst>
+                <p:cond evt="onPrev" delay="0">
+                  <p:tgtEl>
+                    <p:sldTgt/>
+                  </p:tgtEl>
+                </p:cond>
+              </p:prevCondLst>
+              <p:nextCondLst>
+                <p:cond evt="onNext" delay="0">
+                  <p:tgtEl>
+                    <p:sldTgt/>
+                  </p:tgtEl>
+                </p:cond>
+              </p:nextCondLst>
+            </p:seq>
+          </p:childTnLst>
+        </p:cTn>
+      </p:par>
+    </p:tnLst>
+  </p:timing>
 </p:sld>
 </file>
 
-<file path=ppt/slides/slide16.xml><?xml version="1.0" encoding="utf-8"?>
+<file path=ppt/slides/slide17.xml><?xml version="1.0" encoding="utf-8"?>
 <p:sld xmlns:a="http://schemas.openxmlformats.org/drawingml/2006/main" xmlns:r="http://schemas.openxmlformats.org/officeDocument/2006/relationships" xmlns:p="http://schemas.openxmlformats.org/presentationml/2006/main">
   <p:cSld>
     <p:bg>
@@ -8780,13 +9336,13 @@
   <p:clrMapOvr>
     <a:masterClrMapping/>
   </p:clrMapOvr>
-  <mc:AlternateContent xmlns:mc="http://schemas.openxmlformats.org/markup-compatibility/2006">
-    <mc:Choice xmlns:p14="http://schemas.microsoft.com/office/powerpoint/2010/main" Requires="p14">
+  <mc:AlternateContent xmlns:mc="http://schemas.openxmlformats.org/markup-compatibility/2006" xmlns:p14="http://schemas.microsoft.com/office/powerpoint/2010/main">
+    <mc:Choice Requires="p14">
       <p:transition spd="med" p14:dur="700">
         <p:fade/>
       </p:transition>
     </mc:Choice>
-    <mc:Fallback>
+    <mc:Fallback xmlns="">
       <p:transition spd="med">
         <p:fade/>
       </p:transition>
@@ -8795,7 +9351,7 @@
 </p:sld>
 </file>
 
-<file path=ppt/slides/slide17.xml><?xml version="1.0" encoding="utf-8"?>
+<file path=ppt/slides/slide18.xml><?xml version="1.0" encoding="utf-8"?>
 <p:sld xmlns:a="http://schemas.openxmlformats.org/drawingml/2006/main" xmlns:r="http://schemas.openxmlformats.org/officeDocument/2006/relationships" xmlns:p="http://schemas.openxmlformats.org/presentationml/2006/main">
   <p:cSld>
     <p:bg>
@@ -10020,13 +10576,13 @@
   <p:clrMapOvr>
     <a:masterClrMapping/>
   </p:clrMapOvr>
-  <mc:AlternateContent xmlns:mc="http://schemas.openxmlformats.org/markup-compatibility/2006">
-    <mc:Choice xmlns:p159="http://schemas.microsoft.com/office/powerpoint/2015/09/main" Requires="p159">
+  <mc:AlternateContent xmlns:mc="http://schemas.openxmlformats.org/markup-compatibility/2006" xmlns:p159="http://schemas.microsoft.com/office/powerpoint/2015/09/main">
+    <mc:Choice Requires="p159">
       <p:transition spd="slow">
         <p159:morph option="byObject"/>
       </p:transition>
     </mc:Choice>
-    <mc:Fallback>
+    <mc:Fallback xmlns="">
       <p:transition spd="slow">
         <p:fade/>
       </p:transition>
@@ -10394,7 +10950,7 @@
 </p:sld>
 </file>
 
-<file path=ppt/slides/slide18.xml><?xml version="1.0" encoding="utf-8"?>
+<file path=ppt/slides/slide19.xml><?xml version="1.0" encoding="utf-8"?>
 <p:sld xmlns:a="http://schemas.openxmlformats.org/drawingml/2006/main" xmlns:r="http://schemas.openxmlformats.org/officeDocument/2006/relationships" xmlns:p="http://schemas.openxmlformats.org/presentationml/2006/main">
   <p:cSld>
     <p:bg>
@@ -11306,13 +11862,13 @@
   <p:clrMapOvr>
     <a:masterClrMapping/>
   </p:clrMapOvr>
-  <mc:AlternateContent xmlns:mc="http://schemas.openxmlformats.org/markup-compatibility/2006">
-    <mc:Choice xmlns:p14="http://schemas.microsoft.com/office/powerpoint/2010/main" Requires="p14">
+  <mc:AlternateContent xmlns:mc="http://schemas.openxmlformats.org/markup-compatibility/2006" xmlns:p14="http://schemas.microsoft.com/office/powerpoint/2010/main">
+    <mc:Choice Requires="p14">
       <p:transition spd="med" p14:dur="700">
         <p:fade/>
       </p:transition>
     </mc:Choice>
-    <mc:Fallback>
+    <mc:Fallback xmlns="">
       <p:transition spd="med">
         <p:fade/>
       </p:transition>
@@ -11321,7 +11877,7 @@
 </p:sld>
 </file>
 
-<file path=ppt/slides/slide19.xml><?xml version="1.0" encoding="utf-8"?>
+<file path=ppt/slides/slide2.xml><?xml version="1.0" encoding="utf-8"?>
 <p:sld xmlns:a="http://schemas.openxmlformats.org/drawingml/2006/main" xmlns:r="http://schemas.openxmlformats.org/officeDocument/2006/relationships" xmlns:p="http://schemas.openxmlformats.org/presentationml/2006/main">
   <p:cSld>
     <p:bg>
@@ -12182,6 +12738,1097 @@
       </p:sp>
       <p:sp>
         <p:nvSpPr>
+          <p:cNvPr id="5" name="TextBox 4">
+            <a:extLst>
+              <a:ext uri="{FF2B5EF4-FFF2-40B4-BE49-F238E27FC236}">
+                <a16:creationId xmlns:a16="http://schemas.microsoft.com/office/drawing/2014/main" id="{C92B3240-4784-4EDE-BF34-43AB390A9139}"/>
+              </a:ext>
+            </a:extLst>
+          </p:cNvPr>
+          <p:cNvSpPr txBox="1"/>
+          <p:nvPr/>
+        </p:nvSpPr>
+        <p:spPr>
+          <a:xfrm>
+            <a:off x="1501453" y="850100"/>
+            <a:ext cx="1503680" cy="1015663"/>
+          </a:xfrm>
+          <a:prstGeom prst="rect">
+            <a:avLst/>
+          </a:prstGeom>
+          <a:noFill/>
+          <a:ln w="28575">
+            <a:noFill/>
+          </a:ln>
+        </p:spPr>
+        <p:txBody>
+          <a:bodyPr rot="0" spcFirstLastPara="0" vertOverflow="overflow" horzOverflow="overflow" vert="horz" wrap="square" lIns="91440" tIns="45720" rIns="91440" bIns="45720" numCol="1" spcCol="0" rtlCol="0" fromWordArt="0" anchor="t" anchorCtr="0" forceAA="0" compatLnSpc="1">
+            <a:prstTxWarp prst="textNoShape">
+              <a:avLst/>
+            </a:prstTxWarp>
+            <a:spAutoFit/>
+          </a:bodyPr>
+          <a:lstStyle/>
+          <a:p>
+            <a:r>
+              <a:rPr lang="en-US" sz="6000">
+                <a:latin typeface="Calibri Light"/>
+                <a:cs typeface="Arial"/>
+              </a:rPr>
+              <a:t>Aim</a:t>
+            </a:r>
+          </a:p>
+        </p:txBody>
+      </p:sp>
+      <p:sp>
+        <p:nvSpPr>
+          <p:cNvPr id="9" name="TextBox 8">
+            <a:extLst>
+              <a:ext uri="{FF2B5EF4-FFF2-40B4-BE49-F238E27FC236}">
+                <a16:creationId xmlns:a16="http://schemas.microsoft.com/office/drawing/2014/main" id="{4E983A72-A537-440F-B67F-14C7928BC6F3}"/>
+              </a:ext>
+            </a:extLst>
+          </p:cNvPr>
+          <p:cNvSpPr txBox="1"/>
+          <p:nvPr/>
+        </p:nvSpPr>
+        <p:spPr>
+          <a:xfrm>
+            <a:off x="870815" y="2199303"/>
+            <a:ext cx="4649243" cy="4154984"/>
+          </a:xfrm>
+          <a:prstGeom prst="rect">
+            <a:avLst/>
+          </a:prstGeom>
+          <a:noFill/>
+        </p:spPr>
+        <p:txBody>
+          <a:bodyPr rot="0" spcFirstLastPara="0" vertOverflow="overflow" horzOverflow="overflow" vert="horz" wrap="square" lIns="91440" tIns="45720" rIns="91440" bIns="45720" numCol="1" spcCol="0" rtlCol="0" fromWordArt="0" anchor="t" anchorCtr="0" forceAA="0" compatLnSpc="1">
+            <a:prstTxWarp prst="textNoShape">
+              <a:avLst/>
+            </a:prstTxWarp>
+            <a:spAutoFit/>
+          </a:bodyPr>
+          <a:lstStyle/>
+          <a:p>
+            <a:pPr marL="285750" indent="-285750">
+              <a:buFont typeface="Arial"/>
+              <a:buChar char="•"/>
+            </a:pPr>
+            <a:r>
+              <a:rPr lang="en-US" sz="2400">
+                <a:cs typeface="Calibri"/>
+              </a:rPr>
+              <a:t>Microscopic simulation of pedestrian motion</a:t>
+            </a:r>
+          </a:p>
+          <a:p>
+            <a:pPr marL="285750" indent="-285750">
+              <a:buFont typeface="Arial"/>
+              <a:buChar char="•"/>
+            </a:pPr>
+            <a:endParaRPr lang="en-US" sz="2400">
+              <a:cs typeface="Calibri"/>
+            </a:endParaRPr>
+          </a:p>
+          <a:p>
+            <a:pPr marL="285750" indent="-285750">
+              <a:buFont typeface="Arial"/>
+              <a:buChar char="•"/>
+            </a:pPr>
+            <a:r>
+              <a:rPr lang="en-US" sz="2400">
+                <a:cs typeface="Calibri"/>
+              </a:rPr>
+              <a:t>Test the simulation against some simple environment configurations</a:t>
+            </a:r>
+          </a:p>
+          <a:p>
+            <a:pPr marL="285750" indent="-285750">
+              <a:buFont typeface="Arial"/>
+              <a:buChar char="•"/>
+            </a:pPr>
+            <a:endParaRPr lang="en-US" sz="2400">
+              <a:cs typeface="Calibri"/>
+            </a:endParaRPr>
+          </a:p>
+          <a:p>
+            <a:pPr marL="285750" indent="-285750">
+              <a:buFont typeface="Arial"/>
+              <a:buChar char="•"/>
+            </a:pPr>
+            <a:r>
+              <a:rPr lang="en-US" sz="2400">
+                <a:cs typeface="Calibri"/>
+              </a:rPr>
+              <a:t>Apply the simulation to a classroom</a:t>
+            </a:r>
+          </a:p>
+          <a:p>
+            <a:pPr marL="285750" indent="-285750">
+              <a:buFont typeface="Arial"/>
+              <a:buChar char="•"/>
+            </a:pPr>
+            <a:endParaRPr lang="en-US" sz="2400">
+              <a:cs typeface="Calibri"/>
+            </a:endParaRPr>
+          </a:p>
+          <a:p>
+            <a:pPr marL="285750" indent="-285750">
+              <a:buFont typeface="Arial"/>
+              <a:buChar char="•"/>
+            </a:pPr>
+            <a:endParaRPr lang="en-US" sz="2400">
+              <a:cs typeface="Calibri"/>
+            </a:endParaRPr>
+          </a:p>
+        </p:txBody>
+      </p:sp>
+      <p:pic>
+        <p:nvPicPr>
+          <p:cNvPr id="18" name="Picture 18">
+            <a:extLst>
+              <a:ext uri="{FF2B5EF4-FFF2-40B4-BE49-F238E27FC236}">
+                <a16:creationId xmlns:a16="http://schemas.microsoft.com/office/drawing/2014/main" id="{44ECC3C0-9652-40D0-ABDB-12F055F20C3F}"/>
+              </a:ext>
+            </a:extLst>
+          </p:cNvPr>
+          <p:cNvPicPr>
+            <a:picLocks noChangeAspect="1"/>
+          </p:cNvPicPr>
+          <p:nvPr/>
+        </p:nvPicPr>
+        <p:blipFill rotWithShape="1">
+          <a:blip r:embed="rId2"/>
+          <a:srcRect l="6364" r="7738" b="-228"/>
+          <a:stretch/>
+        </p:blipFill>
+        <p:spPr>
+          <a:xfrm rot="-5400000">
+            <a:off x="8021380" y="1987273"/>
+            <a:ext cx="2015170" cy="3251104"/>
+          </a:xfrm>
+          <a:prstGeom prst="rect">
+            <a:avLst/>
+          </a:prstGeom>
+        </p:spPr>
+      </p:pic>
+      <p:pic>
+        <p:nvPicPr>
+          <p:cNvPr id="17" name="Picture 17" descr="A picture containing text, silhouette&#10;&#10;Description automatically generated">
+            <a:extLst>
+              <a:ext uri="{FF2B5EF4-FFF2-40B4-BE49-F238E27FC236}">
+                <a16:creationId xmlns:a16="http://schemas.microsoft.com/office/drawing/2014/main" id="{D562D2E8-E1D5-4C7E-A4F7-870B8FE2B868}"/>
+              </a:ext>
+            </a:extLst>
+          </p:cNvPr>
+          <p:cNvPicPr>
+            <a:picLocks noChangeAspect="1"/>
+          </p:cNvPicPr>
+          <p:nvPr/>
+        </p:nvPicPr>
+        <p:blipFill>
+          <a:blip r:embed="rId3"/>
+          <a:stretch>
+            <a:fillRect/>
+          </a:stretch>
+        </p:blipFill>
+        <p:spPr>
+          <a:xfrm>
+            <a:off x="7408461" y="2598444"/>
+            <a:ext cx="3402841" cy="2434485"/>
+          </a:xfrm>
+          <a:prstGeom prst="rect">
+            <a:avLst/>
+          </a:prstGeom>
+        </p:spPr>
+      </p:pic>
+    </p:spTree>
+    <p:extLst>
+      <p:ext uri="{BB962C8B-B14F-4D97-AF65-F5344CB8AC3E}">
+        <p14:creationId xmlns:p14="http://schemas.microsoft.com/office/powerpoint/2010/main" val="2106446358"/>
+      </p:ext>
+    </p:extLst>
+  </p:cSld>
+  <p:clrMapOvr>
+    <a:masterClrMapping/>
+  </p:clrMapOvr>
+  <mc:AlternateContent xmlns:mc="http://schemas.openxmlformats.org/markup-compatibility/2006" xmlns:p14="http://schemas.microsoft.com/office/powerpoint/2010/main">
+    <mc:Choice Requires="p14">
+      <p:transition spd="med" p14:dur="700">
+        <p:fade/>
+      </p:transition>
+    </mc:Choice>
+    <mc:Fallback xmlns="">
+      <p:transition spd="med">
+        <p:fade/>
+      </p:transition>
+    </mc:Fallback>
+  </mc:AlternateContent>
+</p:sld>
+</file>
+
+<file path=ppt/slides/slide20.xml><?xml version="1.0" encoding="utf-8"?>
+<p:sld xmlns:a="http://schemas.openxmlformats.org/drawingml/2006/main" xmlns:r="http://schemas.openxmlformats.org/officeDocument/2006/relationships" xmlns:p="http://schemas.openxmlformats.org/presentationml/2006/main">
+  <p:cSld>
+    <p:bg>
+      <p:bgPr>
+        <a:solidFill>
+          <a:schemeClr val="bg1"/>
+        </a:solidFill>
+        <a:effectLst/>
+      </p:bgPr>
+    </p:bg>
+    <p:spTree>
+      <p:nvGrpSpPr>
+        <p:cNvPr id="1" name=""/>
+        <p:cNvGrpSpPr/>
+        <p:nvPr/>
+      </p:nvGrpSpPr>
+      <p:grpSpPr>
+        <a:xfrm>
+          <a:off x="0" y="0"/>
+          <a:ext cx="0" cy="0"/>
+          <a:chOff x="0" y="0"/>
+          <a:chExt cx="0" cy="0"/>
+        </a:xfrm>
+      </p:grpSpPr>
+      <p:sp useBgFill="1">
+        <p:nvSpPr>
+          <p:cNvPr id="8" name="Rectangle 7">
+            <a:extLst>
+              <a:ext uri="{FF2B5EF4-FFF2-40B4-BE49-F238E27FC236}">
+                <a16:creationId xmlns:a16="http://schemas.microsoft.com/office/drawing/2014/main" id="{91F32EBA-ED97-466E-8CFA-8382584155D0}"/>
+              </a:ext>
+              <a:ext uri="{C183D7F6-B498-43B3-948B-1728B52AA6E4}">
+                <adec:decorative xmlns:adec="http://schemas.microsoft.com/office/drawing/2017/decorative" val="1"/>
+              </a:ext>
+            </a:extLst>
+          </p:cNvPr>
+          <p:cNvSpPr>
+            <a:spLocks noGrp="1" noRot="1" noChangeAspect="1" noMove="1" noResize="1" noEditPoints="1" noAdjustHandles="1" noChangeArrowheads="1" noChangeShapeType="1" noTextEdit="1"/>
+          </p:cNvSpPr>
+          <p:nvPr>
+            <p:extLst>
+              <p:ext uri="{386F3935-93C4-4BCD-93E2-E3B085C9AB24}">
+                <p16:designElem xmlns:p16="http://schemas.microsoft.com/office/powerpoint/2015/main" val="1"/>
+              </p:ext>
+            </p:extLst>
+          </p:nvPr>
+        </p:nvSpPr>
+        <p:spPr>
+          <a:xfrm>
+            <a:off x="0" y="0"/>
+            <a:ext cx="12192000" cy="6858000"/>
+          </a:xfrm>
+          <a:prstGeom prst="rect">
+            <a:avLst/>
+          </a:prstGeom>
+          <a:ln>
+            <a:noFill/>
+          </a:ln>
+        </p:spPr>
+        <p:style>
+          <a:lnRef idx="2">
+            <a:schemeClr val="accent1">
+              <a:shade val="50000"/>
+            </a:schemeClr>
+          </a:lnRef>
+          <a:fillRef idx="1">
+            <a:schemeClr val="accent1"/>
+          </a:fillRef>
+          <a:effectRef idx="0">
+            <a:schemeClr val="accent1"/>
+          </a:effectRef>
+          <a:fontRef idx="minor">
+            <a:schemeClr val="lt1"/>
+          </a:fontRef>
+        </p:style>
+        <p:txBody>
+          <a:bodyPr rtlCol="0" anchor="ctr"/>
+          <a:lstStyle/>
+          <a:p>
+            <a:pPr algn="ctr"/>
+            <a:endParaRPr lang="en-US"/>
+          </a:p>
+        </p:txBody>
+      </p:sp>
+      <p:sp>
+        <p:nvSpPr>
+          <p:cNvPr id="10" name="Freeform: Shape 9">
+            <a:extLst>
+              <a:ext uri="{FF2B5EF4-FFF2-40B4-BE49-F238E27FC236}">
+                <a16:creationId xmlns:a16="http://schemas.microsoft.com/office/drawing/2014/main" id="{62A38935-BB53-4DF7-A56E-48DD25B685D7}"/>
+              </a:ext>
+              <a:ext uri="{C183D7F6-B498-43B3-948B-1728B52AA6E4}">
+                <adec:decorative xmlns:adec="http://schemas.microsoft.com/office/drawing/2017/decorative" val="1"/>
+              </a:ext>
+            </a:extLst>
+          </p:cNvPr>
+          <p:cNvSpPr>
+            <a:spLocks noGrp="1" noRot="1" noChangeAspect="1" noMove="1" noResize="1" noEditPoints="1" noAdjustHandles="1" noChangeArrowheads="1" noChangeShapeType="1" noTextEdit="1"/>
+          </p:cNvSpPr>
+          <p:nvPr>
+            <p:extLst>
+              <p:ext uri="{386F3935-93C4-4BCD-93E2-E3B085C9AB24}">
+                <p16:designElem xmlns:p16="http://schemas.microsoft.com/office/powerpoint/2015/main" val="1"/>
+              </p:ext>
+            </p:extLst>
+          </p:nvPr>
+        </p:nvSpPr>
+        <p:spPr>
+          <a:xfrm>
+            <a:off x="5510370" y="851518"/>
+            <a:ext cx="6184806" cy="5154967"/>
+          </a:xfrm>
+          <a:custGeom>
+            <a:avLst/>
+            <a:gdLst>
+              <a:gd name="connsiteX0" fmla="*/ 363179 w 6184806"/>
+              <a:gd name="connsiteY0" fmla="*/ 3125191 h 5154967"/>
+              <a:gd name="connsiteX1" fmla="*/ 898270 w 6184806"/>
+              <a:gd name="connsiteY1" fmla="*/ 3125191 h 5154967"/>
+              <a:gd name="connsiteX2" fmla="*/ 980326 w 6184806"/>
+              <a:gd name="connsiteY2" fmla="*/ 3173551 h 5154967"/>
+              <a:gd name="connsiteX3" fmla="*/ 1248448 w 6184806"/>
+              <a:gd name="connsiteY3" fmla="*/ 3635277 h 5154967"/>
+              <a:gd name="connsiteX4" fmla="*/ 1248448 w 6184806"/>
+              <a:gd name="connsiteY4" fmla="*/ 3729695 h 5154967"/>
+              <a:gd name="connsiteX5" fmla="*/ 980326 w 6184806"/>
+              <a:gd name="connsiteY5" fmla="*/ 4191421 h 5154967"/>
+              <a:gd name="connsiteX6" fmla="*/ 898270 w 6184806"/>
+              <a:gd name="connsiteY6" fmla="*/ 4239781 h 5154967"/>
+              <a:gd name="connsiteX7" fmla="*/ 363179 w 6184806"/>
+              <a:gd name="connsiteY7" fmla="*/ 4239781 h 5154967"/>
+              <a:gd name="connsiteX8" fmla="*/ 279969 w 6184806"/>
+              <a:gd name="connsiteY8" fmla="*/ 4191421 h 5154967"/>
+              <a:gd name="connsiteX9" fmla="*/ 13002 w 6184806"/>
+              <a:gd name="connsiteY9" fmla="*/ 3729695 h 5154967"/>
+              <a:gd name="connsiteX10" fmla="*/ 13002 w 6184806"/>
+              <a:gd name="connsiteY10" fmla="*/ 3635277 h 5154967"/>
+              <a:gd name="connsiteX11" fmla="*/ 279969 w 6184806"/>
+              <a:gd name="connsiteY11" fmla="*/ 3173551 h 5154967"/>
+              <a:gd name="connsiteX12" fmla="*/ 363179 w 6184806"/>
+              <a:gd name="connsiteY12" fmla="*/ 3125191 h 5154967"/>
+              <a:gd name="connsiteX13" fmla="*/ 2489721 w 6184806"/>
+              <a:gd name="connsiteY13" fmla="*/ 570035 h 5154967"/>
+              <a:gd name="connsiteX14" fmla="*/ 2764862 w 6184806"/>
+              <a:gd name="connsiteY14" fmla="*/ 570035 h 5154967"/>
+              <a:gd name="connsiteX15" fmla="*/ 2796959 w 6184806"/>
+              <a:gd name="connsiteY15" fmla="*/ 570035 h 5154967"/>
+              <a:gd name="connsiteX16" fmla="*/ 2827587 w 6184806"/>
+              <a:gd name="connsiteY16" fmla="*/ 622777 h 5154967"/>
+              <a:gd name="connsiteX17" fmla="*/ 2977604 w 6184806"/>
+              <a:gd name="connsiteY17" fmla="*/ 881117 h 5154967"/>
+              <a:gd name="connsiteX18" fmla="*/ 2977604 w 6184806"/>
+              <a:gd name="connsiteY18" fmla="*/ 1025720 h 5154967"/>
+              <a:gd name="connsiteX19" fmla="*/ 2566968 w 6184806"/>
+              <a:gd name="connsiteY19" fmla="*/ 1732863 h 5154967"/>
+              <a:gd name="connsiteX20" fmla="*/ 2441299 w 6184806"/>
+              <a:gd name="connsiteY20" fmla="*/ 1806927 h 5154967"/>
+              <a:gd name="connsiteX21" fmla="*/ 1621798 w 6184806"/>
+              <a:gd name="connsiteY21" fmla="*/ 1806927 h 5154967"/>
+              <a:gd name="connsiteX22" fmla="*/ 1583218 w 6184806"/>
+              <a:gd name="connsiteY22" fmla="*/ 1801802 h 5154967"/>
+              <a:gd name="connsiteX23" fmla="*/ 1556683 w 6184806"/>
+              <a:gd name="connsiteY23" fmla="*/ 1790677 h 5154967"/>
+              <a:gd name="connsiteX24" fmla="*/ 1572899 w 6184806"/>
+              <a:gd name="connsiteY24" fmla="*/ 1762631 h 5154967"/>
+              <a:gd name="connsiteX25" fmla="*/ 2147429 w 6184806"/>
+              <a:gd name="connsiteY25" fmla="*/ 768968 h 5154967"/>
+              <a:gd name="connsiteX26" fmla="*/ 2489721 w 6184806"/>
+              <a:gd name="connsiteY26" fmla="*/ 570035 h 5154967"/>
+              <a:gd name="connsiteX27" fmla="*/ 1573268 w 6184806"/>
+              <a:gd name="connsiteY27" fmla="*/ 0 h 5154967"/>
+              <a:gd name="connsiteX28" fmla="*/ 2497662 w 6184806"/>
+              <a:gd name="connsiteY28" fmla="*/ 0 h 5154967"/>
+              <a:gd name="connsiteX29" fmla="*/ 2639415 w 6184806"/>
+              <a:gd name="connsiteY29" fmla="*/ 83546 h 5154967"/>
+              <a:gd name="connsiteX30" fmla="*/ 2887862 w 6184806"/>
+              <a:gd name="connsiteY30" fmla="*/ 511387 h 5154967"/>
+              <a:gd name="connsiteX31" fmla="*/ 2915928 w 6184806"/>
+              <a:gd name="connsiteY31" fmla="*/ 559720 h 5154967"/>
+              <a:gd name="connsiteX32" fmla="*/ 2893844 w 6184806"/>
+              <a:gd name="connsiteY32" fmla="*/ 559720 h 5154967"/>
+              <a:gd name="connsiteX33" fmla="*/ 2789466 w 6184806"/>
+              <a:gd name="connsiteY33" fmla="*/ 559720 h 5154967"/>
+              <a:gd name="connsiteX34" fmla="*/ 2744122 w 6184806"/>
+              <a:gd name="connsiteY34" fmla="*/ 481634 h 5154967"/>
+              <a:gd name="connsiteX35" fmla="*/ 2570885 w 6184806"/>
+              <a:gd name="connsiteY35" fmla="*/ 183309 h 5154967"/>
+              <a:gd name="connsiteX36" fmla="*/ 2445216 w 6184806"/>
+              <a:gd name="connsiteY36" fmla="*/ 109244 h 5154967"/>
+              <a:gd name="connsiteX37" fmla="*/ 1625714 w 6184806"/>
+              <a:gd name="connsiteY37" fmla="*/ 109244 h 5154967"/>
+              <a:gd name="connsiteX38" fmla="*/ 1498276 w 6184806"/>
+              <a:gd name="connsiteY38" fmla="*/ 183309 h 5154967"/>
+              <a:gd name="connsiteX39" fmla="*/ 1089410 w 6184806"/>
+              <a:gd name="connsiteY39" fmla="*/ 890450 h 5154967"/>
+              <a:gd name="connsiteX40" fmla="*/ 1089410 w 6184806"/>
+              <a:gd name="connsiteY40" fmla="*/ 1035054 h 5154967"/>
+              <a:gd name="connsiteX41" fmla="*/ 1498276 w 6184806"/>
+              <a:gd name="connsiteY41" fmla="*/ 1742196 h 5154967"/>
+              <a:gd name="connsiteX42" fmla="*/ 1552039 w 6184806"/>
+              <a:gd name="connsiteY42" fmla="*/ 1796421 h 5154967"/>
+              <a:gd name="connsiteX43" fmla="*/ 1558260 w 6184806"/>
+              <a:gd name="connsiteY43" fmla="*/ 1799029 h 5154967"/>
+              <a:gd name="connsiteX44" fmla="*/ 1524911 w 6184806"/>
+              <a:gd name="connsiteY44" fmla="*/ 1856707 h 5154967"/>
+              <a:gd name="connsiteX45" fmla="*/ 1500108 w 6184806"/>
+              <a:gd name="connsiteY45" fmla="*/ 1899604 h 5154967"/>
+              <a:gd name="connsiteX46" fmla="*/ 1525834 w 6184806"/>
+              <a:gd name="connsiteY46" fmla="*/ 1910390 h 5154967"/>
+              <a:gd name="connsiteX47" fmla="*/ 1569352 w 6184806"/>
+              <a:gd name="connsiteY47" fmla="*/ 1916170 h 5154967"/>
+              <a:gd name="connsiteX48" fmla="*/ 2493745 w 6184806"/>
+              <a:gd name="connsiteY48" fmla="*/ 1916170 h 5154967"/>
+              <a:gd name="connsiteX49" fmla="*/ 2635498 w 6184806"/>
+              <a:gd name="connsiteY49" fmla="*/ 1832627 h 5154967"/>
+              <a:gd name="connsiteX50" fmla="*/ 3098693 w 6184806"/>
+              <a:gd name="connsiteY50" fmla="*/ 1034974 h 5154967"/>
+              <a:gd name="connsiteX51" fmla="*/ 3098693 w 6184806"/>
+              <a:gd name="connsiteY51" fmla="*/ 871863 h 5154967"/>
+              <a:gd name="connsiteX52" fmla="*/ 2945803 w 6184806"/>
+              <a:gd name="connsiteY52" fmla="*/ 608576 h 5154967"/>
+              <a:gd name="connsiteX53" fmla="*/ 2923422 w 6184806"/>
+              <a:gd name="connsiteY53" fmla="*/ 570035 h 5154967"/>
+              <a:gd name="connsiteX54" fmla="*/ 3027104 w 6184806"/>
+              <a:gd name="connsiteY54" fmla="*/ 570035 h 5154967"/>
+              <a:gd name="connsiteX55" fmla="*/ 4690846 w 6184806"/>
+              <a:gd name="connsiteY55" fmla="*/ 570035 h 5154967"/>
+              <a:gd name="connsiteX56" fmla="*/ 5028384 w 6184806"/>
+              <a:gd name="connsiteY56" fmla="*/ 768968 h 5154967"/>
+              <a:gd name="connsiteX57" fmla="*/ 6131323 w 6184806"/>
+              <a:gd name="connsiteY57" fmla="*/ 2668304 h 5154967"/>
+              <a:gd name="connsiteX58" fmla="*/ 6131323 w 6184806"/>
+              <a:gd name="connsiteY58" fmla="*/ 3056698 h 5154967"/>
+              <a:gd name="connsiteX59" fmla="*/ 5028384 w 6184806"/>
+              <a:gd name="connsiteY59" fmla="*/ 4956035 h 5154967"/>
+              <a:gd name="connsiteX60" fmla="*/ 4690846 w 6184806"/>
+              <a:gd name="connsiteY60" fmla="*/ 5154967 h 5154967"/>
+              <a:gd name="connsiteX61" fmla="*/ 2489721 w 6184806"/>
+              <a:gd name="connsiteY61" fmla="*/ 5154967 h 5154967"/>
+              <a:gd name="connsiteX62" fmla="*/ 2147429 w 6184806"/>
+              <a:gd name="connsiteY62" fmla="*/ 4956035 h 5154967"/>
+              <a:gd name="connsiteX63" fmla="*/ 1049243 w 6184806"/>
+              <a:gd name="connsiteY63" fmla="*/ 3056698 h 5154967"/>
+              <a:gd name="connsiteX64" fmla="*/ 1049243 w 6184806"/>
+              <a:gd name="connsiteY64" fmla="*/ 2668304 h 5154967"/>
+              <a:gd name="connsiteX65" fmla="*/ 1457007 w 6184806"/>
+              <a:gd name="connsiteY65" fmla="*/ 1963067 h 5154967"/>
+              <a:gd name="connsiteX66" fmla="*/ 1491373 w 6184806"/>
+              <a:gd name="connsiteY66" fmla="*/ 1903634 h 5154967"/>
+              <a:gd name="connsiteX67" fmla="*/ 1490164 w 6184806"/>
+              <a:gd name="connsiteY67" fmla="*/ 1903127 h 5154967"/>
+              <a:gd name="connsiteX68" fmla="*/ 1429519 w 6184806"/>
+              <a:gd name="connsiteY68" fmla="*/ 1841960 h 5154967"/>
+              <a:gd name="connsiteX69" fmla="*/ 968320 w 6184806"/>
+              <a:gd name="connsiteY69" fmla="*/ 1044307 h 5154967"/>
+              <a:gd name="connsiteX70" fmla="*/ 968320 w 6184806"/>
+              <a:gd name="connsiteY70" fmla="*/ 881196 h 5154967"/>
+              <a:gd name="connsiteX71" fmla="*/ 1429519 w 6184806"/>
+              <a:gd name="connsiteY71" fmla="*/ 83546 h 5154967"/>
+              <a:gd name="connsiteX72" fmla="*/ 1573268 w 6184806"/>
+              <a:gd name="connsiteY72" fmla="*/ 0 h 5154967"/>
+            </a:gdLst>
+            <a:ahLst/>
+            <a:cxnLst>
+              <a:cxn ang="0">
+                <a:pos x="connsiteX0" y="connsiteY0"/>
+              </a:cxn>
+              <a:cxn ang="0">
+                <a:pos x="connsiteX1" y="connsiteY1"/>
+              </a:cxn>
+              <a:cxn ang="0">
+                <a:pos x="connsiteX2" y="connsiteY2"/>
+              </a:cxn>
+              <a:cxn ang="0">
+                <a:pos x="connsiteX3" y="connsiteY3"/>
+              </a:cxn>
+              <a:cxn ang="0">
+                <a:pos x="connsiteX4" y="connsiteY4"/>
+              </a:cxn>
+              <a:cxn ang="0">
+                <a:pos x="connsiteX5" y="connsiteY5"/>
+              </a:cxn>
+              <a:cxn ang="0">
+                <a:pos x="connsiteX6" y="connsiteY6"/>
+              </a:cxn>
+              <a:cxn ang="0">
+                <a:pos x="connsiteX7" y="connsiteY7"/>
+              </a:cxn>
+              <a:cxn ang="0">
+                <a:pos x="connsiteX8" y="connsiteY8"/>
+              </a:cxn>
+              <a:cxn ang="0">
+                <a:pos x="connsiteX9" y="connsiteY9"/>
+              </a:cxn>
+              <a:cxn ang="0">
+                <a:pos x="connsiteX10" y="connsiteY10"/>
+              </a:cxn>
+              <a:cxn ang="0">
+                <a:pos x="connsiteX11" y="connsiteY11"/>
+              </a:cxn>
+              <a:cxn ang="0">
+                <a:pos x="connsiteX12" y="connsiteY12"/>
+              </a:cxn>
+              <a:cxn ang="0">
+                <a:pos x="connsiteX13" y="connsiteY13"/>
+              </a:cxn>
+              <a:cxn ang="0">
+                <a:pos x="connsiteX14" y="connsiteY14"/>
+              </a:cxn>
+              <a:cxn ang="0">
+                <a:pos x="connsiteX15" y="connsiteY15"/>
+              </a:cxn>
+              <a:cxn ang="0">
+                <a:pos x="connsiteX16" y="connsiteY16"/>
+              </a:cxn>
+              <a:cxn ang="0">
+                <a:pos x="connsiteX17" y="connsiteY17"/>
+              </a:cxn>
+              <a:cxn ang="0">
+                <a:pos x="connsiteX18" y="connsiteY18"/>
+              </a:cxn>
+              <a:cxn ang="0">
+                <a:pos x="connsiteX19" y="connsiteY19"/>
+              </a:cxn>
+              <a:cxn ang="0">
+                <a:pos x="connsiteX20" y="connsiteY20"/>
+              </a:cxn>
+              <a:cxn ang="0">
+                <a:pos x="connsiteX21" y="connsiteY21"/>
+              </a:cxn>
+              <a:cxn ang="0">
+                <a:pos x="connsiteX22" y="connsiteY22"/>
+              </a:cxn>
+              <a:cxn ang="0">
+                <a:pos x="connsiteX23" y="connsiteY23"/>
+              </a:cxn>
+              <a:cxn ang="0">
+                <a:pos x="connsiteX24" y="connsiteY24"/>
+              </a:cxn>
+              <a:cxn ang="0">
+                <a:pos x="connsiteX25" y="connsiteY25"/>
+              </a:cxn>
+              <a:cxn ang="0">
+                <a:pos x="connsiteX26" y="connsiteY26"/>
+              </a:cxn>
+              <a:cxn ang="0">
+                <a:pos x="connsiteX27" y="connsiteY27"/>
+              </a:cxn>
+              <a:cxn ang="0">
+                <a:pos x="connsiteX28" y="connsiteY28"/>
+              </a:cxn>
+              <a:cxn ang="0">
+                <a:pos x="connsiteX29" y="connsiteY29"/>
+              </a:cxn>
+              <a:cxn ang="0">
+                <a:pos x="connsiteX30" y="connsiteY30"/>
+              </a:cxn>
+              <a:cxn ang="0">
+                <a:pos x="connsiteX31" y="connsiteY31"/>
+              </a:cxn>
+              <a:cxn ang="0">
+                <a:pos x="connsiteX32" y="connsiteY32"/>
+              </a:cxn>
+              <a:cxn ang="0">
+                <a:pos x="connsiteX33" y="connsiteY33"/>
+              </a:cxn>
+              <a:cxn ang="0">
+                <a:pos x="connsiteX34" y="connsiteY34"/>
+              </a:cxn>
+              <a:cxn ang="0">
+                <a:pos x="connsiteX35" y="connsiteY35"/>
+              </a:cxn>
+              <a:cxn ang="0">
+                <a:pos x="connsiteX36" y="connsiteY36"/>
+              </a:cxn>
+              <a:cxn ang="0">
+                <a:pos x="connsiteX37" y="connsiteY37"/>
+              </a:cxn>
+              <a:cxn ang="0">
+                <a:pos x="connsiteX38" y="connsiteY38"/>
+              </a:cxn>
+              <a:cxn ang="0">
+                <a:pos x="connsiteX39" y="connsiteY39"/>
+              </a:cxn>
+              <a:cxn ang="0">
+                <a:pos x="connsiteX40" y="connsiteY40"/>
+              </a:cxn>
+              <a:cxn ang="0">
+                <a:pos x="connsiteX41" y="connsiteY41"/>
+              </a:cxn>
+              <a:cxn ang="0">
+                <a:pos x="connsiteX42" y="connsiteY42"/>
+              </a:cxn>
+              <a:cxn ang="0">
+                <a:pos x="connsiteX43" y="connsiteY43"/>
+              </a:cxn>
+              <a:cxn ang="0">
+                <a:pos x="connsiteX44" y="connsiteY44"/>
+              </a:cxn>
+              <a:cxn ang="0">
+                <a:pos x="connsiteX45" y="connsiteY45"/>
+              </a:cxn>
+              <a:cxn ang="0">
+                <a:pos x="connsiteX46" y="connsiteY46"/>
+              </a:cxn>
+              <a:cxn ang="0">
+                <a:pos x="connsiteX47" y="connsiteY47"/>
+              </a:cxn>
+              <a:cxn ang="0">
+                <a:pos x="connsiteX48" y="connsiteY48"/>
+              </a:cxn>
+              <a:cxn ang="0">
+                <a:pos x="connsiteX49" y="connsiteY49"/>
+              </a:cxn>
+              <a:cxn ang="0">
+                <a:pos x="connsiteX50" y="connsiteY50"/>
+              </a:cxn>
+              <a:cxn ang="0">
+                <a:pos x="connsiteX51" y="connsiteY51"/>
+              </a:cxn>
+              <a:cxn ang="0">
+                <a:pos x="connsiteX52" y="connsiteY52"/>
+              </a:cxn>
+              <a:cxn ang="0">
+                <a:pos x="connsiteX53" y="connsiteY53"/>
+              </a:cxn>
+              <a:cxn ang="0">
+                <a:pos x="connsiteX54" y="connsiteY54"/>
+              </a:cxn>
+              <a:cxn ang="0">
+                <a:pos x="connsiteX55" y="connsiteY55"/>
+              </a:cxn>
+              <a:cxn ang="0">
+                <a:pos x="connsiteX56" y="connsiteY56"/>
+              </a:cxn>
+              <a:cxn ang="0">
+                <a:pos x="connsiteX57" y="connsiteY57"/>
+              </a:cxn>
+              <a:cxn ang="0">
+                <a:pos x="connsiteX58" y="connsiteY58"/>
+              </a:cxn>
+              <a:cxn ang="0">
+                <a:pos x="connsiteX59" y="connsiteY59"/>
+              </a:cxn>
+              <a:cxn ang="0">
+                <a:pos x="connsiteX60" y="connsiteY60"/>
+              </a:cxn>
+              <a:cxn ang="0">
+                <a:pos x="connsiteX61" y="connsiteY61"/>
+              </a:cxn>
+              <a:cxn ang="0">
+                <a:pos x="connsiteX62" y="connsiteY62"/>
+              </a:cxn>
+              <a:cxn ang="0">
+                <a:pos x="connsiteX63" y="connsiteY63"/>
+              </a:cxn>
+              <a:cxn ang="0">
+                <a:pos x="connsiteX64" y="connsiteY64"/>
+              </a:cxn>
+              <a:cxn ang="0">
+                <a:pos x="connsiteX65" y="connsiteY65"/>
+              </a:cxn>
+              <a:cxn ang="0">
+                <a:pos x="connsiteX66" y="connsiteY66"/>
+              </a:cxn>
+              <a:cxn ang="0">
+                <a:pos x="connsiteX67" y="connsiteY67"/>
+              </a:cxn>
+              <a:cxn ang="0">
+                <a:pos x="connsiteX68" y="connsiteY68"/>
+              </a:cxn>
+              <a:cxn ang="0">
+                <a:pos x="connsiteX69" y="connsiteY69"/>
+              </a:cxn>
+              <a:cxn ang="0">
+                <a:pos x="connsiteX70" y="connsiteY70"/>
+              </a:cxn>
+              <a:cxn ang="0">
+                <a:pos x="connsiteX71" y="connsiteY71"/>
+              </a:cxn>
+              <a:cxn ang="0">
+                <a:pos x="connsiteX72" y="connsiteY72"/>
+              </a:cxn>
+            </a:cxnLst>
+            <a:rect l="l" t="t" r="r" b="b"/>
+            <a:pathLst>
+              <a:path w="6184806" h="5154967">
+                <a:moveTo>
+                  <a:pt x="363179" y="3125191"/>
+                </a:moveTo>
+                <a:cubicBezTo>
+                  <a:pt x="363179" y="3125191"/>
+                  <a:pt x="363179" y="3125191"/>
+                  <a:pt x="898270" y="3125191"/>
+                </a:cubicBezTo>
+                <a:cubicBezTo>
+                  <a:pt x="931786" y="3125191"/>
+                  <a:pt x="964145" y="3143614"/>
+                  <a:pt x="980326" y="3173551"/>
+                </a:cubicBezTo>
+                <a:cubicBezTo>
+                  <a:pt x="980326" y="3173551"/>
+                  <a:pt x="980326" y="3173551"/>
+                  <a:pt x="1248448" y="3635277"/>
+                </a:cubicBezTo>
+                <a:cubicBezTo>
+                  <a:pt x="1265784" y="3664063"/>
+                  <a:pt x="1265784" y="3700909"/>
+                  <a:pt x="1248448" y="3729695"/>
+                </a:cubicBezTo>
+                <a:cubicBezTo>
+                  <a:pt x="1248448" y="3729695"/>
+                  <a:pt x="1248448" y="3729695"/>
+                  <a:pt x="980326" y="4191421"/>
+                </a:cubicBezTo>
+                <a:cubicBezTo>
+                  <a:pt x="964145" y="4221358"/>
+                  <a:pt x="931786" y="4239781"/>
+                  <a:pt x="898270" y="4239781"/>
+                </a:cubicBezTo>
+                <a:cubicBezTo>
+                  <a:pt x="898270" y="4239781"/>
+                  <a:pt x="898270" y="4239781"/>
+                  <a:pt x="363179" y="4239781"/>
+                </a:cubicBezTo>
+                <a:cubicBezTo>
+                  <a:pt x="328508" y="4239781"/>
+                  <a:pt x="297305" y="4221358"/>
+                  <a:pt x="279969" y="4191421"/>
+                </a:cubicBezTo>
+                <a:cubicBezTo>
+                  <a:pt x="279969" y="4191421"/>
+                  <a:pt x="279969" y="4191421"/>
+                  <a:pt x="13002" y="3729695"/>
+                </a:cubicBezTo>
+                <a:cubicBezTo>
+                  <a:pt x="-4334" y="3700909"/>
+                  <a:pt x="-4334" y="3664063"/>
+                  <a:pt x="13002" y="3635277"/>
+                </a:cubicBezTo>
+                <a:cubicBezTo>
+                  <a:pt x="13002" y="3635277"/>
+                  <a:pt x="13002" y="3635277"/>
+                  <a:pt x="279969" y="3173551"/>
+                </a:cubicBezTo>
+                <a:cubicBezTo>
+                  <a:pt x="297305" y="3143614"/>
+                  <a:pt x="328508" y="3125191"/>
+                  <a:pt x="363179" y="3125191"/>
+                </a:cubicBezTo>
+                <a:close/>
+                <a:moveTo>
+                  <a:pt x="2489721" y="570035"/>
+                </a:moveTo>
+                <a:cubicBezTo>
+                  <a:pt x="2489721" y="570035"/>
+                  <a:pt x="2489721" y="570035"/>
+                  <a:pt x="2764862" y="570035"/>
+                </a:cubicBezTo>
+                <a:lnTo>
+                  <a:pt x="2796959" y="570035"/>
+                </a:lnTo>
+                <a:lnTo>
+                  <a:pt x="2827587" y="622777"/>
+                </a:lnTo>
+                <a:cubicBezTo>
+                  <a:pt x="2870233" y="696217"/>
+                  <a:pt x="2919858" y="781675"/>
+                  <a:pt x="2977604" y="881117"/>
+                </a:cubicBezTo>
+                <a:cubicBezTo>
+                  <a:pt x="3004153" y="925204"/>
+                  <a:pt x="3004153" y="981634"/>
+                  <a:pt x="2977604" y="1025720"/>
+                </a:cubicBezTo>
+                <a:cubicBezTo>
+                  <a:pt x="2977604" y="1025720"/>
+                  <a:pt x="2977604" y="1025720"/>
+                  <a:pt x="2566968" y="1732863"/>
+                </a:cubicBezTo>
+                <a:cubicBezTo>
+                  <a:pt x="2542188" y="1778712"/>
+                  <a:pt x="2492629" y="1806927"/>
+                  <a:pt x="2441299" y="1806927"/>
+                </a:cubicBezTo>
+                <a:cubicBezTo>
+                  <a:pt x="2441299" y="1806927"/>
+                  <a:pt x="2441299" y="1806927"/>
+                  <a:pt x="1621798" y="1806927"/>
+                </a:cubicBezTo>
+                <a:cubicBezTo>
+                  <a:pt x="1608523" y="1806927"/>
+                  <a:pt x="1595580" y="1805163"/>
+                  <a:pt x="1583218" y="1801802"/>
+                </a:cubicBezTo>
+                <a:lnTo>
+                  <a:pt x="1556683" y="1790677"/>
+                </a:lnTo>
+                <a:lnTo>
+                  <a:pt x="1572899" y="1762631"/>
+                </a:lnTo>
+                <a:cubicBezTo>
+                  <a:pt x="1719523" y="1509042"/>
+                  <a:pt x="1907201" y="1184448"/>
+                  <a:pt x="2147429" y="768968"/>
+                </a:cubicBezTo>
+                <a:cubicBezTo>
+                  <a:pt x="2218739" y="645819"/>
+                  <a:pt x="2347099" y="570035"/>
+                  <a:pt x="2489721" y="570035"/>
+                </a:cubicBezTo>
+                <a:close/>
+                <a:moveTo>
+                  <a:pt x="1573268" y="0"/>
+                </a:moveTo>
+                <a:cubicBezTo>
+                  <a:pt x="1573268" y="0"/>
+                  <a:pt x="1573268" y="0"/>
+                  <a:pt x="2497662" y="0"/>
+                </a:cubicBezTo>
+                <a:cubicBezTo>
+                  <a:pt x="2555561" y="0"/>
+                  <a:pt x="2611463" y="31828"/>
+                  <a:pt x="2639415" y="83546"/>
+                </a:cubicBezTo>
+                <a:cubicBezTo>
+                  <a:pt x="2639415" y="83546"/>
+                  <a:pt x="2639415" y="83546"/>
+                  <a:pt x="2887862" y="511387"/>
+                </a:cubicBezTo>
+                <a:lnTo>
+                  <a:pt x="2915928" y="559720"/>
+                </a:lnTo>
+                <a:lnTo>
+                  <a:pt x="2893844" y="559720"/>
+                </a:lnTo>
+                <a:lnTo>
+                  <a:pt x="2789466" y="559720"/>
+                </a:lnTo>
+                <a:lnTo>
+                  <a:pt x="2744122" y="481634"/>
+                </a:lnTo>
+                <a:cubicBezTo>
+                  <a:pt x="2570885" y="183309"/>
+                  <a:pt x="2570885" y="183309"/>
+                  <a:pt x="2570885" y="183309"/>
+                </a:cubicBezTo>
+                <a:cubicBezTo>
+                  <a:pt x="2546104" y="137459"/>
+                  <a:pt x="2496545" y="109244"/>
+                  <a:pt x="2445216" y="109244"/>
+                </a:cubicBezTo>
+                <a:cubicBezTo>
+                  <a:pt x="1625714" y="109244"/>
+                  <a:pt x="1625714" y="109244"/>
+                  <a:pt x="1625714" y="109244"/>
+                </a:cubicBezTo>
+                <a:cubicBezTo>
+                  <a:pt x="1572615" y="109244"/>
+                  <a:pt x="1524825" y="137459"/>
+                  <a:pt x="1498276" y="183309"/>
+                </a:cubicBezTo>
+                <a:cubicBezTo>
+                  <a:pt x="1089410" y="890450"/>
+                  <a:pt x="1089410" y="890450"/>
+                  <a:pt x="1089410" y="890450"/>
+                </a:cubicBezTo>
+                <a:cubicBezTo>
+                  <a:pt x="1062860" y="934537"/>
+                  <a:pt x="1062860" y="990968"/>
+                  <a:pt x="1089410" y="1035054"/>
+                </a:cubicBezTo>
+                <a:cubicBezTo>
+                  <a:pt x="1498276" y="1742196"/>
+                  <a:pt x="1498276" y="1742196"/>
+                  <a:pt x="1498276" y="1742196"/>
+                </a:cubicBezTo>
+                <a:cubicBezTo>
+                  <a:pt x="1511551" y="1765121"/>
+                  <a:pt x="1530135" y="1783637"/>
+                  <a:pt x="1552039" y="1796421"/>
+                </a:cubicBezTo>
+                <a:lnTo>
+                  <a:pt x="1558260" y="1799029"/>
+                </a:lnTo>
+                <a:lnTo>
+                  <a:pt x="1524911" y="1856707"/>
+                </a:lnTo>
+                <a:lnTo>
+                  <a:pt x="1500108" y="1899604"/>
+                </a:lnTo>
+                <a:lnTo>
+                  <a:pt x="1525834" y="1910390"/>
+                </a:lnTo>
+                <a:cubicBezTo>
+                  <a:pt x="1539779" y="1914181"/>
+                  <a:pt x="1554378" y="1916170"/>
+                  <a:pt x="1569352" y="1916170"/>
+                </a:cubicBezTo>
+                <a:cubicBezTo>
+                  <a:pt x="2493745" y="1916170"/>
+                  <a:pt x="2493745" y="1916170"/>
+                  <a:pt x="2493745" y="1916170"/>
+                </a:cubicBezTo>
+                <a:cubicBezTo>
+                  <a:pt x="2551645" y="1916170"/>
+                  <a:pt x="2607546" y="1884345"/>
+                  <a:pt x="2635498" y="1832627"/>
+                </a:cubicBezTo>
+                <a:cubicBezTo>
+                  <a:pt x="3098693" y="1034974"/>
+                  <a:pt x="3098693" y="1034974"/>
+                  <a:pt x="3098693" y="1034974"/>
+                </a:cubicBezTo>
+                <a:cubicBezTo>
+                  <a:pt x="3128641" y="985246"/>
+                  <a:pt x="3128641" y="921593"/>
+                  <a:pt x="3098693" y="871863"/>
+                </a:cubicBezTo>
+                <a:cubicBezTo>
+                  <a:pt x="3040794" y="772157"/>
+                  <a:pt x="2990132" y="684914"/>
+                  <a:pt x="2945803" y="608576"/>
+                </a:cubicBezTo>
+                <a:lnTo>
+                  <a:pt x="2923422" y="570035"/>
+                </a:lnTo>
+                <a:lnTo>
+                  <a:pt x="3027104" y="570035"/>
+                </a:lnTo>
+                <a:cubicBezTo>
+                  <a:pt x="3349535" y="570035"/>
+                  <a:pt x="3865424" y="570035"/>
+                  <a:pt x="4690846" y="570035"/>
+                </a:cubicBezTo>
+                <a:cubicBezTo>
+                  <a:pt x="4828714" y="570035"/>
+                  <a:pt x="4961827" y="645819"/>
+                  <a:pt x="5028384" y="768968"/>
+                </a:cubicBezTo>
+                <a:cubicBezTo>
+                  <a:pt x="5028384" y="768968"/>
+                  <a:pt x="5028384" y="768968"/>
+                  <a:pt x="6131323" y="2668304"/>
+                </a:cubicBezTo>
+                <a:cubicBezTo>
+                  <a:pt x="6202634" y="2786717"/>
+                  <a:pt x="6202634" y="2938285"/>
+                  <a:pt x="6131323" y="3056698"/>
+                </a:cubicBezTo>
+                <a:cubicBezTo>
+                  <a:pt x="6131323" y="3056698"/>
+                  <a:pt x="6131323" y="3056698"/>
+                  <a:pt x="5028384" y="4956035"/>
+                </a:cubicBezTo>
+                <a:cubicBezTo>
+                  <a:pt x="4961827" y="5079184"/>
+                  <a:pt x="4828714" y="5154967"/>
+                  <a:pt x="4690846" y="5154967"/>
+                </a:cubicBezTo>
+                <a:cubicBezTo>
+                  <a:pt x="4690846" y="5154967"/>
+                  <a:pt x="4690846" y="5154967"/>
+                  <a:pt x="2489721" y="5154967"/>
+                </a:cubicBezTo>
+                <a:cubicBezTo>
+                  <a:pt x="2347099" y="5154967"/>
+                  <a:pt x="2218739" y="5079184"/>
+                  <a:pt x="2147429" y="4956035"/>
+                </a:cubicBezTo>
+                <a:cubicBezTo>
+                  <a:pt x="2147429" y="4956035"/>
+                  <a:pt x="2147429" y="4956035"/>
+                  <a:pt x="1049243" y="3056698"/>
+                </a:cubicBezTo>
+                <a:cubicBezTo>
+                  <a:pt x="977932" y="2938285"/>
+                  <a:pt x="977932" y="2786717"/>
+                  <a:pt x="1049243" y="2668304"/>
+                </a:cubicBezTo>
+                <a:cubicBezTo>
+                  <a:pt x="1049243" y="2668304"/>
+                  <a:pt x="1049243" y="2668304"/>
+                  <a:pt x="1457007" y="1963067"/>
+                </a:cubicBezTo>
+                <a:lnTo>
+                  <a:pt x="1491373" y="1903634"/>
+                </a:lnTo>
+                <a:lnTo>
+                  <a:pt x="1490164" y="1903127"/>
+                </a:lnTo>
+                <a:cubicBezTo>
+                  <a:pt x="1465456" y="1888705"/>
+                  <a:pt x="1444493" y="1867820"/>
+                  <a:pt x="1429519" y="1841960"/>
+                </a:cubicBezTo>
+                <a:cubicBezTo>
+                  <a:pt x="1429519" y="1841960"/>
+                  <a:pt x="1429519" y="1841960"/>
+                  <a:pt x="968320" y="1044307"/>
+                </a:cubicBezTo>
+                <a:cubicBezTo>
+                  <a:pt x="938371" y="994579"/>
+                  <a:pt x="938371" y="930926"/>
+                  <a:pt x="968320" y="881196"/>
+                </a:cubicBezTo>
+                <a:cubicBezTo>
+                  <a:pt x="968320" y="881196"/>
+                  <a:pt x="968320" y="881196"/>
+                  <a:pt x="1429519" y="83546"/>
+                </a:cubicBezTo>
+                <a:cubicBezTo>
+                  <a:pt x="1459466" y="31828"/>
+                  <a:pt x="1513373" y="0"/>
+                  <a:pt x="1573268" y="0"/>
+                </a:cubicBezTo>
+                <a:close/>
+              </a:path>
+            </a:pathLst>
+          </a:custGeom>
+          <a:solidFill>
+            <a:schemeClr val="tx1">
+              <a:lumMod val="50000"/>
+              <a:lumOff val="50000"/>
+              <a:alpha val="40000"/>
+            </a:schemeClr>
+          </a:solidFill>
+          <a:ln>
+            <a:noFill/>
+          </a:ln>
+        </p:spPr>
+        <p:style>
+          <a:lnRef idx="2">
+            <a:schemeClr val="accent1">
+              <a:shade val="50000"/>
+            </a:schemeClr>
+          </a:lnRef>
+          <a:fillRef idx="1">
+            <a:schemeClr val="accent1"/>
+          </a:fillRef>
+          <a:effectRef idx="0">
+            <a:schemeClr val="accent1"/>
+          </a:effectRef>
+          <a:fontRef idx="minor">
+            <a:schemeClr val="lt1"/>
+          </a:fontRef>
+        </p:style>
+        <p:txBody>
+          <a:bodyPr wrap="square" rtlCol="0" anchor="ctr">
+            <a:noAutofit/>
+          </a:bodyPr>
+          <a:lstStyle/>
+          <a:p>
+            <a:pPr algn="ctr"/>
+            <a:endParaRPr lang="en-US"/>
+          </a:p>
+        </p:txBody>
+      </p:sp>
+      <p:sp>
+        <p:nvSpPr>
           <p:cNvPr id="2" name="Titel 1">
             <a:extLst>
               <a:ext uri="{FF2B5EF4-FFF2-40B4-BE49-F238E27FC236}">
@@ -12379,13 +14026,13 @@
   <p:clrMapOvr>
     <a:masterClrMapping/>
   </p:clrMapOvr>
-  <mc:AlternateContent xmlns:mc="http://schemas.openxmlformats.org/markup-compatibility/2006">
-    <mc:Choice xmlns:p159="http://schemas.microsoft.com/office/powerpoint/2015/09/main" Requires="p159">
+  <mc:AlternateContent xmlns:mc="http://schemas.openxmlformats.org/markup-compatibility/2006" xmlns:p159="http://schemas.microsoft.com/office/powerpoint/2015/09/main">
+    <mc:Choice Requires="p159">
       <p:transition spd="slow">
         <p159:morph option="byObject"/>
       </p:transition>
     </mc:Choice>
-    <mc:Fallback>
+    <mc:Fallback xmlns="">
       <p:transition spd="slow">
         <p:fade/>
       </p:transition>
@@ -12779,1098 +14426,7 @@
 </p:sld>
 </file>
 
-<file path=ppt/slides/slide2.xml><?xml version="1.0" encoding="utf-8"?>
-<p:sld xmlns:a="http://schemas.openxmlformats.org/drawingml/2006/main" xmlns:r="http://schemas.openxmlformats.org/officeDocument/2006/relationships" xmlns:p="http://schemas.openxmlformats.org/presentationml/2006/main">
-  <p:cSld>
-    <p:bg>
-      <p:bgPr>
-        <a:solidFill>
-          <a:schemeClr val="bg1"/>
-        </a:solidFill>
-        <a:effectLst/>
-      </p:bgPr>
-    </p:bg>
-    <p:spTree>
-      <p:nvGrpSpPr>
-        <p:cNvPr id="1" name=""/>
-        <p:cNvGrpSpPr/>
-        <p:nvPr/>
-      </p:nvGrpSpPr>
-      <p:grpSpPr>
-        <a:xfrm>
-          <a:off x="0" y="0"/>
-          <a:ext cx="0" cy="0"/>
-          <a:chOff x="0" y="0"/>
-          <a:chExt cx="0" cy="0"/>
-        </a:xfrm>
-      </p:grpSpPr>
-      <p:sp useBgFill="1">
-        <p:nvSpPr>
-          <p:cNvPr id="8" name="Rectangle 7">
-            <a:extLst>
-              <a:ext uri="{FF2B5EF4-FFF2-40B4-BE49-F238E27FC236}">
-                <a16:creationId xmlns:a16="http://schemas.microsoft.com/office/drawing/2014/main" id="{91F32EBA-ED97-466E-8CFA-8382584155D0}"/>
-              </a:ext>
-              <a:ext uri="{C183D7F6-B498-43B3-948B-1728B52AA6E4}">
-                <adec:decorative xmlns:adec="http://schemas.microsoft.com/office/drawing/2017/decorative" val="1"/>
-              </a:ext>
-            </a:extLst>
-          </p:cNvPr>
-          <p:cNvSpPr>
-            <a:spLocks noGrp="1" noRot="1" noChangeAspect="1" noMove="1" noResize="1" noEditPoints="1" noAdjustHandles="1" noChangeArrowheads="1" noChangeShapeType="1" noTextEdit="1"/>
-          </p:cNvSpPr>
-          <p:nvPr>
-            <p:extLst>
-              <p:ext uri="{386F3935-93C4-4BCD-93E2-E3B085C9AB24}">
-                <p16:designElem xmlns:p16="http://schemas.microsoft.com/office/powerpoint/2015/main" val="1"/>
-              </p:ext>
-            </p:extLst>
-          </p:nvPr>
-        </p:nvSpPr>
-        <p:spPr>
-          <a:xfrm>
-            <a:off x="0" y="0"/>
-            <a:ext cx="12192000" cy="6858000"/>
-          </a:xfrm>
-          <a:prstGeom prst="rect">
-            <a:avLst/>
-          </a:prstGeom>
-          <a:ln>
-            <a:noFill/>
-          </a:ln>
-        </p:spPr>
-        <p:style>
-          <a:lnRef idx="2">
-            <a:schemeClr val="accent1">
-              <a:shade val="50000"/>
-            </a:schemeClr>
-          </a:lnRef>
-          <a:fillRef idx="1">
-            <a:schemeClr val="accent1"/>
-          </a:fillRef>
-          <a:effectRef idx="0">
-            <a:schemeClr val="accent1"/>
-          </a:effectRef>
-          <a:fontRef idx="minor">
-            <a:schemeClr val="lt1"/>
-          </a:fontRef>
-        </p:style>
-        <p:txBody>
-          <a:bodyPr rtlCol="0" anchor="ctr"/>
-          <a:lstStyle/>
-          <a:p>
-            <a:pPr algn="ctr"/>
-            <a:endParaRPr lang="en-US"/>
-          </a:p>
-        </p:txBody>
-      </p:sp>
-      <p:sp>
-        <p:nvSpPr>
-          <p:cNvPr id="10" name="Freeform: Shape 9">
-            <a:extLst>
-              <a:ext uri="{FF2B5EF4-FFF2-40B4-BE49-F238E27FC236}">
-                <a16:creationId xmlns:a16="http://schemas.microsoft.com/office/drawing/2014/main" id="{62A38935-BB53-4DF7-A56E-48DD25B685D7}"/>
-              </a:ext>
-              <a:ext uri="{C183D7F6-B498-43B3-948B-1728B52AA6E4}">
-                <adec:decorative xmlns:adec="http://schemas.microsoft.com/office/drawing/2017/decorative" val="1"/>
-              </a:ext>
-            </a:extLst>
-          </p:cNvPr>
-          <p:cNvSpPr>
-            <a:spLocks noGrp="1" noRot="1" noChangeAspect="1" noMove="1" noResize="1" noEditPoints="1" noAdjustHandles="1" noChangeArrowheads="1" noChangeShapeType="1" noTextEdit="1"/>
-          </p:cNvSpPr>
-          <p:nvPr>
-            <p:extLst>
-              <p:ext uri="{386F3935-93C4-4BCD-93E2-E3B085C9AB24}">
-                <p16:designElem xmlns:p16="http://schemas.microsoft.com/office/powerpoint/2015/main" val="1"/>
-              </p:ext>
-            </p:extLst>
-          </p:nvPr>
-        </p:nvSpPr>
-        <p:spPr>
-          <a:xfrm>
-            <a:off x="5510370" y="851518"/>
-            <a:ext cx="6184806" cy="5154967"/>
-          </a:xfrm>
-          <a:custGeom>
-            <a:avLst/>
-            <a:gdLst>
-              <a:gd name="connsiteX0" fmla="*/ 363179 w 6184806"/>
-              <a:gd name="connsiteY0" fmla="*/ 3125191 h 5154967"/>
-              <a:gd name="connsiteX1" fmla="*/ 898270 w 6184806"/>
-              <a:gd name="connsiteY1" fmla="*/ 3125191 h 5154967"/>
-              <a:gd name="connsiteX2" fmla="*/ 980326 w 6184806"/>
-              <a:gd name="connsiteY2" fmla="*/ 3173551 h 5154967"/>
-              <a:gd name="connsiteX3" fmla="*/ 1248448 w 6184806"/>
-              <a:gd name="connsiteY3" fmla="*/ 3635277 h 5154967"/>
-              <a:gd name="connsiteX4" fmla="*/ 1248448 w 6184806"/>
-              <a:gd name="connsiteY4" fmla="*/ 3729695 h 5154967"/>
-              <a:gd name="connsiteX5" fmla="*/ 980326 w 6184806"/>
-              <a:gd name="connsiteY5" fmla="*/ 4191421 h 5154967"/>
-              <a:gd name="connsiteX6" fmla="*/ 898270 w 6184806"/>
-              <a:gd name="connsiteY6" fmla="*/ 4239781 h 5154967"/>
-              <a:gd name="connsiteX7" fmla="*/ 363179 w 6184806"/>
-              <a:gd name="connsiteY7" fmla="*/ 4239781 h 5154967"/>
-              <a:gd name="connsiteX8" fmla="*/ 279969 w 6184806"/>
-              <a:gd name="connsiteY8" fmla="*/ 4191421 h 5154967"/>
-              <a:gd name="connsiteX9" fmla="*/ 13002 w 6184806"/>
-              <a:gd name="connsiteY9" fmla="*/ 3729695 h 5154967"/>
-              <a:gd name="connsiteX10" fmla="*/ 13002 w 6184806"/>
-              <a:gd name="connsiteY10" fmla="*/ 3635277 h 5154967"/>
-              <a:gd name="connsiteX11" fmla="*/ 279969 w 6184806"/>
-              <a:gd name="connsiteY11" fmla="*/ 3173551 h 5154967"/>
-              <a:gd name="connsiteX12" fmla="*/ 363179 w 6184806"/>
-              <a:gd name="connsiteY12" fmla="*/ 3125191 h 5154967"/>
-              <a:gd name="connsiteX13" fmla="*/ 2489721 w 6184806"/>
-              <a:gd name="connsiteY13" fmla="*/ 570035 h 5154967"/>
-              <a:gd name="connsiteX14" fmla="*/ 2764862 w 6184806"/>
-              <a:gd name="connsiteY14" fmla="*/ 570035 h 5154967"/>
-              <a:gd name="connsiteX15" fmla="*/ 2796959 w 6184806"/>
-              <a:gd name="connsiteY15" fmla="*/ 570035 h 5154967"/>
-              <a:gd name="connsiteX16" fmla="*/ 2827587 w 6184806"/>
-              <a:gd name="connsiteY16" fmla="*/ 622777 h 5154967"/>
-              <a:gd name="connsiteX17" fmla="*/ 2977604 w 6184806"/>
-              <a:gd name="connsiteY17" fmla="*/ 881117 h 5154967"/>
-              <a:gd name="connsiteX18" fmla="*/ 2977604 w 6184806"/>
-              <a:gd name="connsiteY18" fmla="*/ 1025720 h 5154967"/>
-              <a:gd name="connsiteX19" fmla="*/ 2566968 w 6184806"/>
-              <a:gd name="connsiteY19" fmla="*/ 1732863 h 5154967"/>
-              <a:gd name="connsiteX20" fmla="*/ 2441299 w 6184806"/>
-              <a:gd name="connsiteY20" fmla="*/ 1806927 h 5154967"/>
-              <a:gd name="connsiteX21" fmla="*/ 1621798 w 6184806"/>
-              <a:gd name="connsiteY21" fmla="*/ 1806927 h 5154967"/>
-              <a:gd name="connsiteX22" fmla="*/ 1583218 w 6184806"/>
-              <a:gd name="connsiteY22" fmla="*/ 1801802 h 5154967"/>
-              <a:gd name="connsiteX23" fmla="*/ 1556683 w 6184806"/>
-              <a:gd name="connsiteY23" fmla="*/ 1790677 h 5154967"/>
-              <a:gd name="connsiteX24" fmla="*/ 1572899 w 6184806"/>
-              <a:gd name="connsiteY24" fmla="*/ 1762631 h 5154967"/>
-              <a:gd name="connsiteX25" fmla="*/ 2147429 w 6184806"/>
-              <a:gd name="connsiteY25" fmla="*/ 768968 h 5154967"/>
-              <a:gd name="connsiteX26" fmla="*/ 2489721 w 6184806"/>
-              <a:gd name="connsiteY26" fmla="*/ 570035 h 5154967"/>
-              <a:gd name="connsiteX27" fmla="*/ 1573268 w 6184806"/>
-              <a:gd name="connsiteY27" fmla="*/ 0 h 5154967"/>
-              <a:gd name="connsiteX28" fmla="*/ 2497662 w 6184806"/>
-              <a:gd name="connsiteY28" fmla="*/ 0 h 5154967"/>
-              <a:gd name="connsiteX29" fmla="*/ 2639415 w 6184806"/>
-              <a:gd name="connsiteY29" fmla="*/ 83546 h 5154967"/>
-              <a:gd name="connsiteX30" fmla="*/ 2887862 w 6184806"/>
-              <a:gd name="connsiteY30" fmla="*/ 511387 h 5154967"/>
-              <a:gd name="connsiteX31" fmla="*/ 2915928 w 6184806"/>
-              <a:gd name="connsiteY31" fmla="*/ 559720 h 5154967"/>
-              <a:gd name="connsiteX32" fmla="*/ 2893844 w 6184806"/>
-              <a:gd name="connsiteY32" fmla="*/ 559720 h 5154967"/>
-              <a:gd name="connsiteX33" fmla="*/ 2789466 w 6184806"/>
-              <a:gd name="connsiteY33" fmla="*/ 559720 h 5154967"/>
-              <a:gd name="connsiteX34" fmla="*/ 2744122 w 6184806"/>
-              <a:gd name="connsiteY34" fmla="*/ 481634 h 5154967"/>
-              <a:gd name="connsiteX35" fmla="*/ 2570885 w 6184806"/>
-              <a:gd name="connsiteY35" fmla="*/ 183309 h 5154967"/>
-              <a:gd name="connsiteX36" fmla="*/ 2445216 w 6184806"/>
-              <a:gd name="connsiteY36" fmla="*/ 109244 h 5154967"/>
-              <a:gd name="connsiteX37" fmla="*/ 1625714 w 6184806"/>
-              <a:gd name="connsiteY37" fmla="*/ 109244 h 5154967"/>
-              <a:gd name="connsiteX38" fmla="*/ 1498276 w 6184806"/>
-              <a:gd name="connsiteY38" fmla="*/ 183309 h 5154967"/>
-              <a:gd name="connsiteX39" fmla="*/ 1089410 w 6184806"/>
-              <a:gd name="connsiteY39" fmla="*/ 890450 h 5154967"/>
-              <a:gd name="connsiteX40" fmla="*/ 1089410 w 6184806"/>
-              <a:gd name="connsiteY40" fmla="*/ 1035054 h 5154967"/>
-              <a:gd name="connsiteX41" fmla="*/ 1498276 w 6184806"/>
-              <a:gd name="connsiteY41" fmla="*/ 1742196 h 5154967"/>
-              <a:gd name="connsiteX42" fmla="*/ 1552039 w 6184806"/>
-              <a:gd name="connsiteY42" fmla="*/ 1796421 h 5154967"/>
-              <a:gd name="connsiteX43" fmla="*/ 1558260 w 6184806"/>
-              <a:gd name="connsiteY43" fmla="*/ 1799029 h 5154967"/>
-              <a:gd name="connsiteX44" fmla="*/ 1524911 w 6184806"/>
-              <a:gd name="connsiteY44" fmla="*/ 1856707 h 5154967"/>
-              <a:gd name="connsiteX45" fmla="*/ 1500108 w 6184806"/>
-              <a:gd name="connsiteY45" fmla="*/ 1899604 h 5154967"/>
-              <a:gd name="connsiteX46" fmla="*/ 1525834 w 6184806"/>
-              <a:gd name="connsiteY46" fmla="*/ 1910390 h 5154967"/>
-              <a:gd name="connsiteX47" fmla="*/ 1569352 w 6184806"/>
-              <a:gd name="connsiteY47" fmla="*/ 1916170 h 5154967"/>
-              <a:gd name="connsiteX48" fmla="*/ 2493745 w 6184806"/>
-              <a:gd name="connsiteY48" fmla="*/ 1916170 h 5154967"/>
-              <a:gd name="connsiteX49" fmla="*/ 2635498 w 6184806"/>
-              <a:gd name="connsiteY49" fmla="*/ 1832627 h 5154967"/>
-              <a:gd name="connsiteX50" fmla="*/ 3098693 w 6184806"/>
-              <a:gd name="connsiteY50" fmla="*/ 1034974 h 5154967"/>
-              <a:gd name="connsiteX51" fmla="*/ 3098693 w 6184806"/>
-              <a:gd name="connsiteY51" fmla="*/ 871863 h 5154967"/>
-              <a:gd name="connsiteX52" fmla="*/ 2945803 w 6184806"/>
-              <a:gd name="connsiteY52" fmla="*/ 608576 h 5154967"/>
-              <a:gd name="connsiteX53" fmla="*/ 2923422 w 6184806"/>
-              <a:gd name="connsiteY53" fmla="*/ 570035 h 5154967"/>
-              <a:gd name="connsiteX54" fmla="*/ 3027104 w 6184806"/>
-              <a:gd name="connsiteY54" fmla="*/ 570035 h 5154967"/>
-              <a:gd name="connsiteX55" fmla="*/ 4690846 w 6184806"/>
-              <a:gd name="connsiteY55" fmla="*/ 570035 h 5154967"/>
-              <a:gd name="connsiteX56" fmla="*/ 5028384 w 6184806"/>
-              <a:gd name="connsiteY56" fmla="*/ 768968 h 5154967"/>
-              <a:gd name="connsiteX57" fmla="*/ 6131323 w 6184806"/>
-              <a:gd name="connsiteY57" fmla="*/ 2668304 h 5154967"/>
-              <a:gd name="connsiteX58" fmla="*/ 6131323 w 6184806"/>
-              <a:gd name="connsiteY58" fmla="*/ 3056698 h 5154967"/>
-              <a:gd name="connsiteX59" fmla="*/ 5028384 w 6184806"/>
-              <a:gd name="connsiteY59" fmla="*/ 4956035 h 5154967"/>
-              <a:gd name="connsiteX60" fmla="*/ 4690846 w 6184806"/>
-              <a:gd name="connsiteY60" fmla="*/ 5154967 h 5154967"/>
-              <a:gd name="connsiteX61" fmla="*/ 2489721 w 6184806"/>
-              <a:gd name="connsiteY61" fmla="*/ 5154967 h 5154967"/>
-              <a:gd name="connsiteX62" fmla="*/ 2147429 w 6184806"/>
-              <a:gd name="connsiteY62" fmla="*/ 4956035 h 5154967"/>
-              <a:gd name="connsiteX63" fmla="*/ 1049243 w 6184806"/>
-              <a:gd name="connsiteY63" fmla="*/ 3056698 h 5154967"/>
-              <a:gd name="connsiteX64" fmla="*/ 1049243 w 6184806"/>
-              <a:gd name="connsiteY64" fmla="*/ 2668304 h 5154967"/>
-              <a:gd name="connsiteX65" fmla="*/ 1457007 w 6184806"/>
-              <a:gd name="connsiteY65" fmla="*/ 1963067 h 5154967"/>
-              <a:gd name="connsiteX66" fmla="*/ 1491373 w 6184806"/>
-              <a:gd name="connsiteY66" fmla="*/ 1903634 h 5154967"/>
-              <a:gd name="connsiteX67" fmla="*/ 1490164 w 6184806"/>
-              <a:gd name="connsiteY67" fmla="*/ 1903127 h 5154967"/>
-              <a:gd name="connsiteX68" fmla="*/ 1429519 w 6184806"/>
-              <a:gd name="connsiteY68" fmla="*/ 1841960 h 5154967"/>
-              <a:gd name="connsiteX69" fmla="*/ 968320 w 6184806"/>
-              <a:gd name="connsiteY69" fmla="*/ 1044307 h 5154967"/>
-              <a:gd name="connsiteX70" fmla="*/ 968320 w 6184806"/>
-              <a:gd name="connsiteY70" fmla="*/ 881196 h 5154967"/>
-              <a:gd name="connsiteX71" fmla="*/ 1429519 w 6184806"/>
-              <a:gd name="connsiteY71" fmla="*/ 83546 h 5154967"/>
-              <a:gd name="connsiteX72" fmla="*/ 1573268 w 6184806"/>
-              <a:gd name="connsiteY72" fmla="*/ 0 h 5154967"/>
-            </a:gdLst>
-            <a:ahLst/>
-            <a:cxnLst>
-              <a:cxn ang="0">
-                <a:pos x="connsiteX0" y="connsiteY0"/>
-              </a:cxn>
-              <a:cxn ang="0">
-                <a:pos x="connsiteX1" y="connsiteY1"/>
-              </a:cxn>
-              <a:cxn ang="0">
-                <a:pos x="connsiteX2" y="connsiteY2"/>
-              </a:cxn>
-              <a:cxn ang="0">
-                <a:pos x="connsiteX3" y="connsiteY3"/>
-              </a:cxn>
-              <a:cxn ang="0">
-                <a:pos x="connsiteX4" y="connsiteY4"/>
-              </a:cxn>
-              <a:cxn ang="0">
-                <a:pos x="connsiteX5" y="connsiteY5"/>
-              </a:cxn>
-              <a:cxn ang="0">
-                <a:pos x="connsiteX6" y="connsiteY6"/>
-              </a:cxn>
-              <a:cxn ang="0">
-                <a:pos x="connsiteX7" y="connsiteY7"/>
-              </a:cxn>
-              <a:cxn ang="0">
-                <a:pos x="connsiteX8" y="connsiteY8"/>
-              </a:cxn>
-              <a:cxn ang="0">
-                <a:pos x="connsiteX9" y="connsiteY9"/>
-              </a:cxn>
-              <a:cxn ang="0">
-                <a:pos x="connsiteX10" y="connsiteY10"/>
-              </a:cxn>
-              <a:cxn ang="0">
-                <a:pos x="connsiteX11" y="connsiteY11"/>
-              </a:cxn>
-              <a:cxn ang="0">
-                <a:pos x="connsiteX12" y="connsiteY12"/>
-              </a:cxn>
-              <a:cxn ang="0">
-                <a:pos x="connsiteX13" y="connsiteY13"/>
-              </a:cxn>
-              <a:cxn ang="0">
-                <a:pos x="connsiteX14" y="connsiteY14"/>
-              </a:cxn>
-              <a:cxn ang="0">
-                <a:pos x="connsiteX15" y="connsiteY15"/>
-              </a:cxn>
-              <a:cxn ang="0">
-                <a:pos x="connsiteX16" y="connsiteY16"/>
-              </a:cxn>
-              <a:cxn ang="0">
-                <a:pos x="connsiteX17" y="connsiteY17"/>
-              </a:cxn>
-              <a:cxn ang="0">
-                <a:pos x="connsiteX18" y="connsiteY18"/>
-              </a:cxn>
-              <a:cxn ang="0">
-                <a:pos x="connsiteX19" y="connsiteY19"/>
-              </a:cxn>
-              <a:cxn ang="0">
-                <a:pos x="connsiteX20" y="connsiteY20"/>
-              </a:cxn>
-              <a:cxn ang="0">
-                <a:pos x="connsiteX21" y="connsiteY21"/>
-              </a:cxn>
-              <a:cxn ang="0">
-                <a:pos x="connsiteX22" y="connsiteY22"/>
-              </a:cxn>
-              <a:cxn ang="0">
-                <a:pos x="connsiteX23" y="connsiteY23"/>
-              </a:cxn>
-              <a:cxn ang="0">
-                <a:pos x="connsiteX24" y="connsiteY24"/>
-              </a:cxn>
-              <a:cxn ang="0">
-                <a:pos x="connsiteX25" y="connsiteY25"/>
-              </a:cxn>
-              <a:cxn ang="0">
-                <a:pos x="connsiteX26" y="connsiteY26"/>
-              </a:cxn>
-              <a:cxn ang="0">
-                <a:pos x="connsiteX27" y="connsiteY27"/>
-              </a:cxn>
-              <a:cxn ang="0">
-                <a:pos x="connsiteX28" y="connsiteY28"/>
-              </a:cxn>
-              <a:cxn ang="0">
-                <a:pos x="connsiteX29" y="connsiteY29"/>
-              </a:cxn>
-              <a:cxn ang="0">
-                <a:pos x="connsiteX30" y="connsiteY30"/>
-              </a:cxn>
-              <a:cxn ang="0">
-                <a:pos x="connsiteX31" y="connsiteY31"/>
-              </a:cxn>
-              <a:cxn ang="0">
-                <a:pos x="connsiteX32" y="connsiteY32"/>
-              </a:cxn>
-              <a:cxn ang="0">
-                <a:pos x="connsiteX33" y="connsiteY33"/>
-              </a:cxn>
-              <a:cxn ang="0">
-                <a:pos x="connsiteX34" y="connsiteY34"/>
-              </a:cxn>
-              <a:cxn ang="0">
-                <a:pos x="connsiteX35" y="connsiteY35"/>
-              </a:cxn>
-              <a:cxn ang="0">
-                <a:pos x="connsiteX36" y="connsiteY36"/>
-              </a:cxn>
-              <a:cxn ang="0">
-                <a:pos x="connsiteX37" y="connsiteY37"/>
-              </a:cxn>
-              <a:cxn ang="0">
-                <a:pos x="connsiteX38" y="connsiteY38"/>
-              </a:cxn>
-              <a:cxn ang="0">
-                <a:pos x="connsiteX39" y="connsiteY39"/>
-              </a:cxn>
-              <a:cxn ang="0">
-                <a:pos x="connsiteX40" y="connsiteY40"/>
-              </a:cxn>
-              <a:cxn ang="0">
-                <a:pos x="connsiteX41" y="connsiteY41"/>
-              </a:cxn>
-              <a:cxn ang="0">
-                <a:pos x="connsiteX42" y="connsiteY42"/>
-              </a:cxn>
-              <a:cxn ang="0">
-                <a:pos x="connsiteX43" y="connsiteY43"/>
-              </a:cxn>
-              <a:cxn ang="0">
-                <a:pos x="connsiteX44" y="connsiteY44"/>
-              </a:cxn>
-              <a:cxn ang="0">
-                <a:pos x="connsiteX45" y="connsiteY45"/>
-              </a:cxn>
-              <a:cxn ang="0">
-                <a:pos x="connsiteX46" y="connsiteY46"/>
-              </a:cxn>
-              <a:cxn ang="0">
-                <a:pos x="connsiteX47" y="connsiteY47"/>
-              </a:cxn>
-              <a:cxn ang="0">
-                <a:pos x="connsiteX48" y="connsiteY48"/>
-              </a:cxn>
-              <a:cxn ang="0">
-                <a:pos x="connsiteX49" y="connsiteY49"/>
-              </a:cxn>
-              <a:cxn ang="0">
-                <a:pos x="connsiteX50" y="connsiteY50"/>
-              </a:cxn>
-              <a:cxn ang="0">
-                <a:pos x="connsiteX51" y="connsiteY51"/>
-              </a:cxn>
-              <a:cxn ang="0">
-                <a:pos x="connsiteX52" y="connsiteY52"/>
-              </a:cxn>
-              <a:cxn ang="0">
-                <a:pos x="connsiteX53" y="connsiteY53"/>
-              </a:cxn>
-              <a:cxn ang="0">
-                <a:pos x="connsiteX54" y="connsiteY54"/>
-              </a:cxn>
-              <a:cxn ang="0">
-                <a:pos x="connsiteX55" y="connsiteY55"/>
-              </a:cxn>
-              <a:cxn ang="0">
-                <a:pos x="connsiteX56" y="connsiteY56"/>
-              </a:cxn>
-              <a:cxn ang="0">
-                <a:pos x="connsiteX57" y="connsiteY57"/>
-              </a:cxn>
-              <a:cxn ang="0">
-                <a:pos x="connsiteX58" y="connsiteY58"/>
-              </a:cxn>
-              <a:cxn ang="0">
-                <a:pos x="connsiteX59" y="connsiteY59"/>
-              </a:cxn>
-              <a:cxn ang="0">
-                <a:pos x="connsiteX60" y="connsiteY60"/>
-              </a:cxn>
-              <a:cxn ang="0">
-                <a:pos x="connsiteX61" y="connsiteY61"/>
-              </a:cxn>
-              <a:cxn ang="0">
-                <a:pos x="connsiteX62" y="connsiteY62"/>
-              </a:cxn>
-              <a:cxn ang="0">
-                <a:pos x="connsiteX63" y="connsiteY63"/>
-              </a:cxn>
-              <a:cxn ang="0">
-                <a:pos x="connsiteX64" y="connsiteY64"/>
-              </a:cxn>
-              <a:cxn ang="0">
-                <a:pos x="connsiteX65" y="connsiteY65"/>
-              </a:cxn>
-              <a:cxn ang="0">
-                <a:pos x="connsiteX66" y="connsiteY66"/>
-              </a:cxn>
-              <a:cxn ang="0">
-                <a:pos x="connsiteX67" y="connsiteY67"/>
-              </a:cxn>
-              <a:cxn ang="0">
-                <a:pos x="connsiteX68" y="connsiteY68"/>
-              </a:cxn>
-              <a:cxn ang="0">
-                <a:pos x="connsiteX69" y="connsiteY69"/>
-              </a:cxn>
-              <a:cxn ang="0">
-                <a:pos x="connsiteX70" y="connsiteY70"/>
-              </a:cxn>
-              <a:cxn ang="0">
-                <a:pos x="connsiteX71" y="connsiteY71"/>
-              </a:cxn>
-              <a:cxn ang="0">
-                <a:pos x="connsiteX72" y="connsiteY72"/>
-              </a:cxn>
-            </a:cxnLst>
-            <a:rect l="l" t="t" r="r" b="b"/>
-            <a:pathLst>
-              <a:path w="6184806" h="5154967">
-                <a:moveTo>
-                  <a:pt x="363179" y="3125191"/>
-                </a:moveTo>
-                <a:cubicBezTo>
-                  <a:pt x="363179" y="3125191"/>
-                  <a:pt x="363179" y="3125191"/>
-                  <a:pt x="898270" y="3125191"/>
-                </a:cubicBezTo>
-                <a:cubicBezTo>
-                  <a:pt x="931786" y="3125191"/>
-                  <a:pt x="964145" y="3143614"/>
-                  <a:pt x="980326" y="3173551"/>
-                </a:cubicBezTo>
-                <a:cubicBezTo>
-                  <a:pt x="980326" y="3173551"/>
-                  <a:pt x="980326" y="3173551"/>
-                  <a:pt x="1248448" y="3635277"/>
-                </a:cubicBezTo>
-                <a:cubicBezTo>
-                  <a:pt x="1265784" y="3664063"/>
-                  <a:pt x="1265784" y="3700909"/>
-                  <a:pt x="1248448" y="3729695"/>
-                </a:cubicBezTo>
-                <a:cubicBezTo>
-                  <a:pt x="1248448" y="3729695"/>
-                  <a:pt x="1248448" y="3729695"/>
-                  <a:pt x="980326" y="4191421"/>
-                </a:cubicBezTo>
-                <a:cubicBezTo>
-                  <a:pt x="964145" y="4221358"/>
-                  <a:pt x="931786" y="4239781"/>
-                  <a:pt x="898270" y="4239781"/>
-                </a:cubicBezTo>
-                <a:cubicBezTo>
-                  <a:pt x="898270" y="4239781"/>
-                  <a:pt x="898270" y="4239781"/>
-                  <a:pt x="363179" y="4239781"/>
-                </a:cubicBezTo>
-                <a:cubicBezTo>
-                  <a:pt x="328508" y="4239781"/>
-                  <a:pt x="297305" y="4221358"/>
-                  <a:pt x="279969" y="4191421"/>
-                </a:cubicBezTo>
-                <a:cubicBezTo>
-                  <a:pt x="279969" y="4191421"/>
-                  <a:pt x="279969" y="4191421"/>
-                  <a:pt x="13002" y="3729695"/>
-                </a:cubicBezTo>
-                <a:cubicBezTo>
-                  <a:pt x="-4334" y="3700909"/>
-                  <a:pt x="-4334" y="3664063"/>
-                  <a:pt x="13002" y="3635277"/>
-                </a:cubicBezTo>
-                <a:cubicBezTo>
-                  <a:pt x="13002" y="3635277"/>
-                  <a:pt x="13002" y="3635277"/>
-                  <a:pt x="279969" y="3173551"/>
-                </a:cubicBezTo>
-                <a:cubicBezTo>
-                  <a:pt x="297305" y="3143614"/>
-                  <a:pt x="328508" y="3125191"/>
-                  <a:pt x="363179" y="3125191"/>
-                </a:cubicBezTo>
-                <a:close/>
-                <a:moveTo>
-                  <a:pt x="2489721" y="570035"/>
-                </a:moveTo>
-                <a:cubicBezTo>
-                  <a:pt x="2489721" y="570035"/>
-                  <a:pt x="2489721" y="570035"/>
-                  <a:pt x="2764862" y="570035"/>
-                </a:cubicBezTo>
-                <a:lnTo>
-                  <a:pt x="2796959" y="570035"/>
-                </a:lnTo>
-                <a:lnTo>
-                  <a:pt x="2827587" y="622777"/>
-                </a:lnTo>
-                <a:cubicBezTo>
-                  <a:pt x="2870233" y="696217"/>
-                  <a:pt x="2919858" y="781675"/>
-                  <a:pt x="2977604" y="881117"/>
-                </a:cubicBezTo>
-                <a:cubicBezTo>
-                  <a:pt x="3004153" y="925204"/>
-                  <a:pt x="3004153" y="981634"/>
-                  <a:pt x="2977604" y="1025720"/>
-                </a:cubicBezTo>
-                <a:cubicBezTo>
-                  <a:pt x="2977604" y="1025720"/>
-                  <a:pt x="2977604" y="1025720"/>
-                  <a:pt x="2566968" y="1732863"/>
-                </a:cubicBezTo>
-                <a:cubicBezTo>
-                  <a:pt x="2542188" y="1778712"/>
-                  <a:pt x="2492629" y="1806927"/>
-                  <a:pt x="2441299" y="1806927"/>
-                </a:cubicBezTo>
-                <a:cubicBezTo>
-                  <a:pt x="2441299" y="1806927"/>
-                  <a:pt x="2441299" y="1806927"/>
-                  <a:pt x="1621798" y="1806927"/>
-                </a:cubicBezTo>
-                <a:cubicBezTo>
-                  <a:pt x="1608523" y="1806927"/>
-                  <a:pt x="1595580" y="1805163"/>
-                  <a:pt x="1583218" y="1801802"/>
-                </a:cubicBezTo>
-                <a:lnTo>
-                  <a:pt x="1556683" y="1790677"/>
-                </a:lnTo>
-                <a:lnTo>
-                  <a:pt x="1572899" y="1762631"/>
-                </a:lnTo>
-                <a:cubicBezTo>
-                  <a:pt x="1719523" y="1509042"/>
-                  <a:pt x="1907201" y="1184448"/>
-                  <a:pt x="2147429" y="768968"/>
-                </a:cubicBezTo>
-                <a:cubicBezTo>
-                  <a:pt x="2218739" y="645819"/>
-                  <a:pt x="2347099" y="570035"/>
-                  <a:pt x="2489721" y="570035"/>
-                </a:cubicBezTo>
-                <a:close/>
-                <a:moveTo>
-                  <a:pt x="1573268" y="0"/>
-                </a:moveTo>
-                <a:cubicBezTo>
-                  <a:pt x="1573268" y="0"/>
-                  <a:pt x="1573268" y="0"/>
-                  <a:pt x="2497662" y="0"/>
-                </a:cubicBezTo>
-                <a:cubicBezTo>
-                  <a:pt x="2555561" y="0"/>
-                  <a:pt x="2611463" y="31828"/>
-                  <a:pt x="2639415" y="83546"/>
-                </a:cubicBezTo>
-                <a:cubicBezTo>
-                  <a:pt x="2639415" y="83546"/>
-                  <a:pt x="2639415" y="83546"/>
-                  <a:pt x="2887862" y="511387"/>
-                </a:cubicBezTo>
-                <a:lnTo>
-                  <a:pt x="2915928" y="559720"/>
-                </a:lnTo>
-                <a:lnTo>
-                  <a:pt x="2893844" y="559720"/>
-                </a:lnTo>
-                <a:lnTo>
-                  <a:pt x="2789466" y="559720"/>
-                </a:lnTo>
-                <a:lnTo>
-                  <a:pt x="2744122" y="481634"/>
-                </a:lnTo>
-                <a:cubicBezTo>
-                  <a:pt x="2570885" y="183309"/>
-                  <a:pt x="2570885" y="183309"/>
-                  <a:pt x="2570885" y="183309"/>
-                </a:cubicBezTo>
-                <a:cubicBezTo>
-                  <a:pt x="2546104" y="137459"/>
-                  <a:pt x="2496545" y="109244"/>
-                  <a:pt x="2445216" y="109244"/>
-                </a:cubicBezTo>
-                <a:cubicBezTo>
-                  <a:pt x="1625714" y="109244"/>
-                  <a:pt x="1625714" y="109244"/>
-                  <a:pt x="1625714" y="109244"/>
-                </a:cubicBezTo>
-                <a:cubicBezTo>
-                  <a:pt x="1572615" y="109244"/>
-                  <a:pt x="1524825" y="137459"/>
-                  <a:pt x="1498276" y="183309"/>
-                </a:cubicBezTo>
-                <a:cubicBezTo>
-                  <a:pt x="1089410" y="890450"/>
-                  <a:pt x="1089410" y="890450"/>
-                  <a:pt x="1089410" y="890450"/>
-                </a:cubicBezTo>
-                <a:cubicBezTo>
-                  <a:pt x="1062860" y="934537"/>
-                  <a:pt x="1062860" y="990968"/>
-                  <a:pt x="1089410" y="1035054"/>
-                </a:cubicBezTo>
-                <a:cubicBezTo>
-                  <a:pt x="1498276" y="1742196"/>
-                  <a:pt x="1498276" y="1742196"/>
-                  <a:pt x="1498276" y="1742196"/>
-                </a:cubicBezTo>
-                <a:cubicBezTo>
-                  <a:pt x="1511551" y="1765121"/>
-                  <a:pt x="1530135" y="1783637"/>
-                  <a:pt x="1552039" y="1796421"/>
-                </a:cubicBezTo>
-                <a:lnTo>
-                  <a:pt x="1558260" y="1799029"/>
-                </a:lnTo>
-                <a:lnTo>
-                  <a:pt x="1524911" y="1856707"/>
-                </a:lnTo>
-                <a:lnTo>
-                  <a:pt x="1500108" y="1899604"/>
-                </a:lnTo>
-                <a:lnTo>
-                  <a:pt x="1525834" y="1910390"/>
-                </a:lnTo>
-                <a:cubicBezTo>
-                  <a:pt x="1539779" y="1914181"/>
-                  <a:pt x="1554378" y="1916170"/>
-                  <a:pt x="1569352" y="1916170"/>
-                </a:cubicBezTo>
-                <a:cubicBezTo>
-                  <a:pt x="2493745" y="1916170"/>
-                  <a:pt x="2493745" y="1916170"/>
-                  <a:pt x="2493745" y="1916170"/>
-                </a:cubicBezTo>
-                <a:cubicBezTo>
-                  <a:pt x="2551645" y="1916170"/>
-                  <a:pt x="2607546" y="1884345"/>
-                  <a:pt x="2635498" y="1832627"/>
-                </a:cubicBezTo>
-                <a:cubicBezTo>
-                  <a:pt x="3098693" y="1034974"/>
-                  <a:pt x="3098693" y="1034974"/>
-                  <a:pt x="3098693" y="1034974"/>
-                </a:cubicBezTo>
-                <a:cubicBezTo>
-                  <a:pt x="3128641" y="985246"/>
-                  <a:pt x="3128641" y="921593"/>
-                  <a:pt x="3098693" y="871863"/>
-                </a:cubicBezTo>
-                <a:cubicBezTo>
-                  <a:pt x="3040794" y="772157"/>
-                  <a:pt x="2990132" y="684914"/>
-                  <a:pt x="2945803" y="608576"/>
-                </a:cubicBezTo>
-                <a:lnTo>
-                  <a:pt x="2923422" y="570035"/>
-                </a:lnTo>
-                <a:lnTo>
-                  <a:pt x="3027104" y="570035"/>
-                </a:lnTo>
-                <a:cubicBezTo>
-                  <a:pt x="3349535" y="570035"/>
-                  <a:pt x="3865424" y="570035"/>
-                  <a:pt x="4690846" y="570035"/>
-                </a:cubicBezTo>
-                <a:cubicBezTo>
-                  <a:pt x="4828714" y="570035"/>
-                  <a:pt x="4961827" y="645819"/>
-                  <a:pt x="5028384" y="768968"/>
-                </a:cubicBezTo>
-                <a:cubicBezTo>
-                  <a:pt x="5028384" y="768968"/>
-                  <a:pt x="5028384" y="768968"/>
-                  <a:pt x="6131323" y="2668304"/>
-                </a:cubicBezTo>
-                <a:cubicBezTo>
-                  <a:pt x="6202634" y="2786717"/>
-                  <a:pt x="6202634" y="2938285"/>
-                  <a:pt x="6131323" y="3056698"/>
-                </a:cubicBezTo>
-                <a:cubicBezTo>
-                  <a:pt x="6131323" y="3056698"/>
-                  <a:pt x="6131323" y="3056698"/>
-                  <a:pt x="5028384" y="4956035"/>
-                </a:cubicBezTo>
-                <a:cubicBezTo>
-                  <a:pt x="4961827" y="5079184"/>
-                  <a:pt x="4828714" y="5154967"/>
-                  <a:pt x="4690846" y="5154967"/>
-                </a:cubicBezTo>
-                <a:cubicBezTo>
-                  <a:pt x="4690846" y="5154967"/>
-                  <a:pt x="4690846" y="5154967"/>
-                  <a:pt x="2489721" y="5154967"/>
-                </a:cubicBezTo>
-                <a:cubicBezTo>
-                  <a:pt x="2347099" y="5154967"/>
-                  <a:pt x="2218739" y="5079184"/>
-                  <a:pt x="2147429" y="4956035"/>
-                </a:cubicBezTo>
-                <a:cubicBezTo>
-                  <a:pt x="2147429" y="4956035"/>
-                  <a:pt x="2147429" y="4956035"/>
-                  <a:pt x="1049243" y="3056698"/>
-                </a:cubicBezTo>
-                <a:cubicBezTo>
-                  <a:pt x="977932" y="2938285"/>
-                  <a:pt x="977932" y="2786717"/>
-                  <a:pt x="1049243" y="2668304"/>
-                </a:cubicBezTo>
-                <a:cubicBezTo>
-                  <a:pt x="1049243" y="2668304"/>
-                  <a:pt x="1049243" y="2668304"/>
-                  <a:pt x="1457007" y="1963067"/>
-                </a:cubicBezTo>
-                <a:lnTo>
-                  <a:pt x="1491373" y="1903634"/>
-                </a:lnTo>
-                <a:lnTo>
-                  <a:pt x="1490164" y="1903127"/>
-                </a:lnTo>
-                <a:cubicBezTo>
-                  <a:pt x="1465456" y="1888705"/>
-                  <a:pt x="1444493" y="1867820"/>
-                  <a:pt x="1429519" y="1841960"/>
-                </a:cubicBezTo>
-                <a:cubicBezTo>
-                  <a:pt x="1429519" y="1841960"/>
-                  <a:pt x="1429519" y="1841960"/>
-                  <a:pt x="968320" y="1044307"/>
-                </a:cubicBezTo>
-                <a:cubicBezTo>
-                  <a:pt x="938371" y="994579"/>
-                  <a:pt x="938371" y="930926"/>
-                  <a:pt x="968320" y="881196"/>
-                </a:cubicBezTo>
-                <a:cubicBezTo>
-                  <a:pt x="968320" y="881196"/>
-                  <a:pt x="968320" y="881196"/>
-                  <a:pt x="1429519" y="83546"/>
-                </a:cubicBezTo>
-                <a:cubicBezTo>
-                  <a:pt x="1459466" y="31828"/>
-                  <a:pt x="1513373" y="0"/>
-                  <a:pt x="1573268" y="0"/>
-                </a:cubicBezTo>
-                <a:close/>
-              </a:path>
-            </a:pathLst>
-          </a:custGeom>
-          <a:solidFill>
-            <a:schemeClr val="tx1">
-              <a:lumMod val="50000"/>
-              <a:lumOff val="50000"/>
-              <a:alpha val="40000"/>
-            </a:schemeClr>
-          </a:solidFill>
-          <a:ln>
-            <a:noFill/>
-          </a:ln>
-        </p:spPr>
-        <p:style>
-          <a:lnRef idx="2">
-            <a:schemeClr val="accent1">
-              <a:shade val="50000"/>
-            </a:schemeClr>
-          </a:lnRef>
-          <a:fillRef idx="1">
-            <a:schemeClr val="accent1"/>
-          </a:fillRef>
-          <a:effectRef idx="0">
-            <a:schemeClr val="accent1"/>
-          </a:effectRef>
-          <a:fontRef idx="minor">
-            <a:schemeClr val="lt1"/>
-          </a:fontRef>
-        </p:style>
-        <p:txBody>
-          <a:bodyPr wrap="square" rtlCol="0" anchor="ctr">
-            <a:noAutofit/>
-          </a:bodyPr>
-          <a:lstStyle/>
-          <a:p>
-            <a:pPr algn="ctr"/>
-            <a:endParaRPr lang="en-US"/>
-          </a:p>
-        </p:txBody>
-      </p:sp>
-      <p:sp>
-        <p:nvSpPr>
-          <p:cNvPr id="5" name="TextBox 4">
-            <a:extLst>
-              <a:ext uri="{FF2B5EF4-FFF2-40B4-BE49-F238E27FC236}">
-                <a16:creationId xmlns:a16="http://schemas.microsoft.com/office/drawing/2014/main" id="{C92B3240-4784-4EDE-BF34-43AB390A9139}"/>
-              </a:ext>
-            </a:extLst>
-          </p:cNvPr>
-          <p:cNvSpPr txBox="1"/>
-          <p:nvPr/>
-        </p:nvSpPr>
-        <p:spPr>
-          <a:xfrm>
-            <a:off x="1501453" y="850100"/>
-            <a:ext cx="1503680" cy="1015663"/>
-          </a:xfrm>
-          <a:prstGeom prst="rect">
-            <a:avLst/>
-          </a:prstGeom>
-          <a:noFill/>
-          <a:ln w="28575">
-            <a:noFill/>
-          </a:ln>
-        </p:spPr>
-        <p:txBody>
-          <a:bodyPr rot="0" spcFirstLastPara="0" vertOverflow="overflow" horzOverflow="overflow" vert="horz" wrap="square" lIns="91440" tIns="45720" rIns="91440" bIns="45720" numCol="1" spcCol="0" rtlCol="0" fromWordArt="0" anchor="t" anchorCtr="0" forceAA="0" compatLnSpc="1">
-            <a:prstTxWarp prst="textNoShape">
-              <a:avLst/>
-            </a:prstTxWarp>
-            <a:spAutoFit/>
-          </a:bodyPr>
-          <a:lstStyle/>
-          <a:p>
-            <a:r>
-              <a:rPr lang="en-US" sz="6000">
-                <a:latin typeface="Calibri Light"/>
-                <a:cs typeface="Arial"/>
-              </a:rPr>
-              <a:t>Aim</a:t>
-            </a:r>
-          </a:p>
-        </p:txBody>
-      </p:sp>
-      <p:sp>
-        <p:nvSpPr>
-          <p:cNvPr id="9" name="TextBox 8">
-            <a:extLst>
-              <a:ext uri="{FF2B5EF4-FFF2-40B4-BE49-F238E27FC236}">
-                <a16:creationId xmlns:a16="http://schemas.microsoft.com/office/drawing/2014/main" id="{4E983A72-A537-440F-B67F-14C7928BC6F3}"/>
-              </a:ext>
-            </a:extLst>
-          </p:cNvPr>
-          <p:cNvSpPr txBox="1"/>
-          <p:nvPr/>
-        </p:nvSpPr>
-        <p:spPr>
-          <a:xfrm>
-            <a:off x="870815" y="2199303"/>
-            <a:ext cx="4649243" cy="4154984"/>
-          </a:xfrm>
-          <a:prstGeom prst="rect">
-            <a:avLst/>
-          </a:prstGeom>
-          <a:noFill/>
-        </p:spPr>
-        <p:txBody>
-          <a:bodyPr rot="0" spcFirstLastPara="0" vertOverflow="overflow" horzOverflow="overflow" vert="horz" wrap="square" lIns="91440" tIns="45720" rIns="91440" bIns="45720" numCol="1" spcCol="0" rtlCol="0" fromWordArt="0" anchor="t" anchorCtr="0" forceAA="0" compatLnSpc="1">
-            <a:prstTxWarp prst="textNoShape">
-              <a:avLst/>
-            </a:prstTxWarp>
-            <a:spAutoFit/>
-          </a:bodyPr>
-          <a:lstStyle/>
-          <a:p>
-            <a:pPr marL="285750" indent="-285750">
-              <a:buFont typeface="Arial"/>
-              <a:buChar char="•"/>
-            </a:pPr>
-            <a:r>
-              <a:rPr lang="en-US" sz="2400">
-                <a:cs typeface="Calibri"/>
-              </a:rPr>
-              <a:t>Microscopic simulation of pedestrian motion</a:t>
-            </a:r>
-          </a:p>
-          <a:p>
-            <a:pPr marL="285750" indent="-285750">
-              <a:buFont typeface="Arial"/>
-              <a:buChar char="•"/>
-            </a:pPr>
-            <a:endParaRPr lang="en-US" sz="2400">
-              <a:cs typeface="Calibri"/>
-            </a:endParaRPr>
-          </a:p>
-          <a:p>
-            <a:pPr marL="285750" indent="-285750">
-              <a:buFont typeface="Arial"/>
-              <a:buChar char="•"/>
-            </a:pPr>
-            <a:r>
-              <a:rPr lang="en-US" sz="2400">
-                <a:cs typeface="Calibri"/>
-              </a:rPr>
-              <a:t>Test the simulation against some simple environment configurations</a:t>
-            </a:r>
-          </a:p>
-          <a:p>
-            <a:pPr marL="285750" indent="-285750">
-              <a:buFont typeface="Arial"/>
-              <a:buChar char="•"/>
-            </a:pPr>
-            <a:endParaRPr lang="en-US" sz="2400">
-              <a:cs typeface="Calibri"/>
-            </a:endParaRPr>
-          </a:p>
-          <a:p>
-            <a:pPr marL="285750" indent="-285750">
-              <a:buFont typeface="Arial"/>
-              <a:buChar char="•"/>
-            </a:pPr>
-            <a:r>
-              <a:rPr lang="en-US" sz="2400">
-                <a:cs typeface="Calibri"/>
-              </a:rPr>
-              <a:t>Apply the simulation to a classroom</a:t>
-            </a:r>
-          </a:p>
-          <a:p>
-            <a:pPr marL="285750" indent="-285750">
-              <a:buFont typeface="Arial"/>
-              <a:buChar char="•"/>
-            </a:pPr>
-            <a:endParaRPr lang="en-US" sz="2400">
-              <a:cs typeface="Calibri"/>
-            </a:endParaRPr>
-          </a:p>
-          <a:p>
-            <a:pPr marL="285750" indent="-285750">
-              <a:buFont typeface="Arial"/>
-              <a:buChar char="•"/>
-            </a:pPr>
-            <a:endParaRPr lang="en-US" sz="2400">
-              <a:cs typeface="Calibri"/>
-            </a:endParaRPr>
-          </a:p>
-        </p:txBody>
-      </p:sp>
-      <p:pic>
-        <p:nvPicPr>
-          <p:cNvPr id="18" name="Picture 18">
-            <a:extLst>
-              <a:ext uri="{FF2B5EF4-FFF2-40B4-BE49-F238E27FC236}">
-                <a16:creationId xmlns:a16="http://schemas.microsoft.com/office/drawing/2014/main" id="{44ECC3C0-9652-40D0-ABDB-12F055F20C3F}"/>
-              </a:ext>
-            </a:extLst>
-          </p:cNvPr>
-          <p:cNvPicPr>
-            <a:picLocks noChangeAspect="1"/>
-          </p:cNvPicPr>
-          <p:nvPr/>
-        </p:nvPicPr>
-        <p:blipFill rotWithShape="1">
-          <a:blip r:embed="rId2"/>
-          <a:srcRect l="6364" r="7738" b="-228"/>
-          <a:stretch/>
-        </p:blipFill>
-        <p:spPr>
-          <a:xfrm rot="-5400000">
-            <a:off x="8021380" y="1987273"/>
-            <a:ext cx="2015170" cy="3251104"/>
-          </a:xfrm>
-          <a:prstGeom prst="rect">
-            <a:avLst/>
-          </a:prstGeom>
-        </p:spPr>
-      </p:pic>
-      <p:pic>
-        <p:nvPicPr>
-          <p:cNvPr id="17" name="Picture 17" descr="A picture containing text, silhouette&#10;&#10;Description automatically generated">
-            <a:extLst>
-              <a:ext uri="{FF2B5EF4-FFF2-40B4-BE49-F238E27FC236}">
-                <a16:creationId xmlns:a16="http://schemas.microsoft.com/office/drawing/2014/main" id="{D562D2E8-E1D5-4C7E-A4F7-870B8FE2B868}"/>
-              </a:ext>
-            </a:extLst>
-          </p:cNvPr>
-          <p:cNvPicPr>
-            <a:picLocks noChangeAspect="1"/>
-          </p:cNvPicPr>
-          <p:nvPr/>
-        </p:nvPicPr>
-        <p:blipFill>
-          <a:blip r:embed="rId3"/>
-          <a:stretch>
-            <a:fillRect/>
-          </a:stretch>
-        </p:blipFill>
-        <p:spPr>
-          <a:xfrm>
-            <a:off x="7408461" y="2598444"/>
-            <a:ext cx="3402841" cy="2434485"/>
-          </a:xfrm>
-          <a:prstGeom prst="rect">
-            <a:avLst/>
-          </a:prstGeom>
-        </p:spPr>
-      </p:pic>
-    </p:spTree>
-    <p:extLst>
-      <p:ext uri="{BB962C8B-B14F-4D97-AF65-F5344CB8AC3E}">
-        <p14:creationId xmlns:p14="http://schemas.microsoft.com/office/powerpoint/2010/main" val="2106446358"/>
-      </p:ext>
-    </p:extLst>
-  </p:cSld>
-  <p:clrMapOvr>
-    <a:masterClrMapping/>
-  </p:clrMapOvr>
-  <mc:AlternateContent xmlns:mc="http://schemas.openxmlformats.org/markup-compatibility/2006">
-    <mc:Choice xmlns:p14="http://schemas.microsoft.com/office/powerpoint/2010/main" Requires="p14">
-      <p:transition spd="med" p14:dur="700">
-        <p:fade/>
-      </p:transition>
-    </mc:Choice>
-    <mc:Fallback>
-      <p:transition spd="med">
-        <p:fade/>
-      </p:transition>
-    </mc:Fallback>
-  </mc:AlternateContent>
-</p:sld>
-</file>
-
-<file path=ppt/slides/slide20.xml><?xml version="1.0" encoding="utf-8"?>
+<file path=ppt/slides/slide21.xml><?xml version="1.0" encoding="utf-8"?>
 <p:sld xmlns:a="http://schemas.openxmlformats.org/drawingml/2006/main" xmlns:r="http://schemas.openxmlformats.org/officeDocument/2006/relationships" xmlns:p="http://schemas.openxmlformats.org/presentationml/2006/main">
   <p:cSld>
     <p:bg>
@@ -15303,8 +15859,8 @@
           </a:p>
         </p:txBody>
       </p:sp>
-      <mc:AlternateContent xmlns:mc="http://schemas.openxmlformats.org/markup-compatibility/2006">
-        <mc:Choice xmlns:a14="http://schemas.microsoft.com/office/drawing/2010/main" Requires="a14">
+      <mc:AlternateContent xmlns:mc="http://schemas.openxmlformats.org/markup-compatibility/2006" xmlns:a14="http://schemas.microsoft.com/office/drawing/2010/main">
+        <mc:Choice Requires="a14">
           <p:sp>
             <p:nvSpPr>
               <p:cNvPr id="15" name="CasellaDiTesto 2">
@@ -15409,7 +15965,7 @@
             </p:txBody>
           </p:sp>
         </mc:Choice>
-        <mc:Fallback>
+        <mc:Fallback xmlns="">
           <p:sp>
             <p:nvSpPr>
               <p:cNvPr id="15" name="CasellaDiTesto 2">
@@ -15454,8 +16010,8 @@
           </p:sp>
         </mc:Fallback>
       </mc:AlternateContent>
-      <mc:AlternateContent xmlns:mc="http://schemas.openxmlformats.org/markup-compatibility/2006">
-        <mc:Choice xmlns:p14="http://schemas.microsoft.com/office/powerpoint/2010/main" Requires="p14">
+      <mc:AlternateContent xmlns:mc="http://schemas.openxmlformats.org/markup-compatibility/2006" xmlns:p14="http://schemas.microsoft.com/office/powerpoint/2010/main">
+        <mc:Choice Requires="p14">
           <p:contentPart p14:bwMode="auto" r:id="rId3">
             <p14:nvContentPartPr>
               <p14:cNvPr id="16" name="Input penna 4">
@@ -15474,7 +16030,7 @@
             </p14:xfrm>
           </p:contentPart>
         </mc:Choice>
-        <mc:Fallback>
+        <mc:Fallback xmlns="">
           <p:pic>
             <p:nvPicPr>
               <p:cNvPr id="16" name="Input penna 4">
@@ -15505,8 +16061,8 @@
           </p:pic>
         </mc:Fallback>
       </mc:AlternateContent>
-      <mc:AlternateContent xmlns:mc="http://schemas.openxmlformats.org/markup-compatibility/2006">
-        <mc:Choice xmlns:a14="http://schemas.microsoft.com/office/drawing/2010/main" Requires="a14">
+      <mc:AlternateContent xmlns:mc="http://schemas.openxmlformats.org/markup-compatibility/2006" xmlns:a14="http://schemas.microsoft.com/office/drawing/2010/main">
+        <mc:Choice Requires="a14">
           <p:sp>
             <p:nvSpPr>
               <p:cNvPr id="17" name="Rettangolo 3">
@@ -15737,7 +16293,7 @@
             </p:txBody>
           </p:sp>
         </mc:Choice>
-        <mc:Fallback>
+        <mc:Fallback xmlns="">
           <p:sp>
             <p:nvSpPr>
               <p:cNvPr id="17" name="Rettangolo 3">
@@ -17143,8 +17699,8 @@
           </a:p>
         </p:txBody>
       </p:sp>
-      <mc:AlternateContent xmlns:mc="http://schemas.openxmlformats.org/markup-compatibility/2006">
-        <mc:Choice xmlns:a14="http://schemas.microsoft.com/office/drawing/2010/main" Requires="a14">
+      <mc:AlternateContent xmlns:mc="http://schemas.openxmlformats.org/markup-compatibility/2006" xmlns:a14="http://schemas.microsoft.com/office/drawing/2010/main">
+        <mc:Choice Requires="a14">
           <p:sp>
             <p:nvSpPr>
               <p:cNvPr id="32" name="Inhaltsplatzhalter 2">
@@ -18166,7 +18722,7 @@
             </p:txBody>
           </p:sp>
         </mc:Choice>
-        <mc:Fallback>
+        <mc:Fallback xmlns="">
           <p:sp>
             <p:nvSpPr>
               <p:cNvPr id="32" name="Inhaltsplatzhalter 2">
@@ -18289,8 +18845,8 @@
           </a:prstGeom>
         </p:spPr>
       </p:pic>
-      <mc:AlternateContent xmlns:mc="http://schemas.openxmlformats.org/markup-compatibility/2006">
-        <mc:Choice xmlns:a14="http://schemas.microsoft.com/office/drawing/2010/main" Requires="a14">
+      <mc:AlternateContent xmlns:mc="http://schemas.openxmlformats.org/markup-compatibility/2006" xmlns:a14="http://schemas.microsoft.com/office/drawing/2010/main">
+        <mc:Choice Requires="a14">
           <p:sp>
             <p:nvSpPr>
               <p:cNvPr id="35" name="Inhaltsplatzhalter 2">
@@ -18755,7 +19311,7 @@
             </p:txBody>
           </p:sp>
         </mc:Choice>
-        <mc:Fallback>
+        <mc:Fallback xmlns="">
           <p:sp>
             <p:nvSpPr>
               <p:cNvPr id="35" name="Inhaltsplatzhalter 2">
@@ -18800,8 +19356,8 @@
           </p:sp>
         </mc:Fallback>
       </mc:AlternateContent>
-      <mc:AlternateContent xmlns:mc="http://schemas.openxmlformats.org/markup-compatibility/2006">
-        <mc:Choice xmlns:a14="http://schemas.microsoft.com/office/drawing/2010/main" Requires="a14">
+      <mc:AlternateContent xmlns:mc="http://schemas.openxmlformats.org/markup-compatibility/2006" xmlns:a14="http://schemas.microsoft.com/office/drawing/2010/main">
+        <mc:Choice Requires="a14">
           <p:sp>
             <p:nvSpPr>
               <p:cNvPr id="36" name="Inhaltsplatzhalter 2">
@@ -19222,7 +19778,7 @@
             </p:txBody>
           </p:sp>
         </mc:Choice>
-        <mc:Fallback>
+        <mc:Fallback xmlns="">
           <p:sp>
             <p:nvSpPr>
               <p:cNvPr id="36" name="Inhaltsplatzhalter 2">
@@ -19277,13 +19833,13 @@
   <p:clrMapOvr>
     <a:masterClrMapping/>
   </p:clrMapOvr>
-  <mc:AlternateContent xmlns:mc="http://schemas.openxmlformats.org/markup-compatibility/2006">
-    <mc:Choice xmlns:p159="http://schemas.microsoft.com/office/powerpoint/2015/09/main" Requires="p159">
+  <mc:AlternateContent xmlns:mc="http://schemas.openxmlformats.org/markup-compatibility/2006" xmlns:p159="http://schemas.microsoft.com/office/powerpoint/2015/09/main">
+    <mc:Choice Requires="p159">
       <p:transition spd="slow">
         <p159:morph option="byObject"/>
       </p:transition>
     </mc:Choice>
-    <mc:Fallback>
+    <mc:Fallback xmlns="">
       <p:transition spd="slow">
         <p:fade/>
       </p:transition>
@@ -20863,8 +21419,8 @@
           </a:p>
         </p:txBody>
       </p:sp>
-      <mc:AlternateContent xmlns:mc="http://schemas.openxmlformats.org/markup-compatibility/2006">
-        <mc:Choice xmlns:a14="http://schemas.microsoft.com/office/drawing/2010/main" Requires="a14">
+      <mc:AlternateContent xmlns:mc="http://schemas.openxmlformats.org/markup-compatibility/2006" xmlns:a14="http://schemas.microsoft.com/office/drawing/2010/main">
+        <mc:Choice Requires="a14">
           <p:sp>
             <p:nvSpPr>
               <p:cNvPr id="14" name="Rettangolo 3">
@@ -21544,7 +22100,7 @@
             </p:txBody>
           </p:sp>
         </mc:Choice>
-        <mc:Fallback>
+        <mc:Fallback xmlns="">
           <p:sp>
             <p:nvSpPr>
               <p:cNvPr id="14" name="Rettangolo 3">
@@ -21589,8 +22145,8 @@
           </p:sp>
         </mc:Fallback>
       </mc:AlternateContent>
-      <mc:AlternateContent xmlns:mc="http://schemas.openxmlformats.org/markup-compatibility/2006">
-        <mc:Choice xmlns:a14="http://schemas.microsoft.com/office/drawing/2010/main" Requires="a14">
+      <mc:AlternateContent xmlns:mc="http://schemas.openxmlformats.org/markup-compatibility/2006" xmlns:a14="http://schemas.microsoft.com/office/drawing/2010/main">
+        <mc:Choice Requires="a14">
           <p:sp>
             <p:nvSpPr>
               <p:cNvPr id="16" name="Rettangolo 4">
@@ -21649,7 +22205,7 @@
             </p:txBody>
           </p:sp>
         </mc:Choice>
-        <mc:Fallback>
+        <mc:Fallback xmlns="">
           <p:sp>
             <p:nvSpPr>
               <p:cNvPr id="16" name="Rettangolo 4">
@@ -21704,13 +22260,13 @@
   <p:clrMapOvr>
     <a:masterClrMapping/>
   </p:clrMapOvr>
-  <mc:AlternateContent xmlns:mc="http://schemas.openxmlformats.org/markup-compatibility/2006">
-    <mc:Choice xmlns:p159="http://schemas.microsoft.com/office/powerpoint/2015/09/main" Requires="p159">
+  <mc:AlternateContent xmlns:mc="http://schemas.openxmlformats.org/markup-compatibility/2006" xmlns:p159="http://schemas.microsoft.com/office/powerpoint/2015/09/main">
+    <mc:Choice Requires="p159">
       <p:transition spd="slow">
         <p159:morph option="byObject"/>
       </p:transition>
     </mc:Choice>
-    <mc:Fallback>
+    <mc:Fallback xmlns="">
       <p:transition spd="slow">
         <p:fade/>
       </p:transition>
@@ -22831,13 +23387,13 @@
   <p:clrMapOvr>
     <a:masterClrMapping/>
   </p:clrMapOvr>
-  <mc:AlternateContent xmlns:mc="http://schemas.openxmlformats.org/markup-compatibility/2006">
-    <mc:Choice xmlns:p14="http://schemas.microsoft.com/office/powerpoint/2010/main" Requires="p14">
+  <mc:AlternateContent xmlns:mc="http://schemas.openxmlformats.org/markup-compatibility/2006" xmlns:p14="http://schemas.microsoft.com/office/powerpoint/2010/main">
+    <mc:Choice Requires="p14">
       <p:transition spd="med" p14:dur="700">
         <p:fade/>
       </p:transition>
     </mc:Choice>
-    <mc:Fallback>
+    <mc:Fallback xmlns="">
       <p:transition spd="med">
         <p:fade/>
       </p:transition>
@@ -23001,13 +23557,13 @@
   <p:clrMapOvr>
     <a:masterClrMapping/>
   </p:clrMapOvr>
-  <mc:AlternateContent xmlns:mc="http://schemas.openxmlformats.org/markup-compatibility/2006">
-    <mc:Choice xmlns:p159="http://schemas.microsoft.com/office/powerpoint/2015/09/main" Requires="p159">
+  <mc:AlternateContent xmlns:mc="http://schemas.openxmlformats.org/markup-compatibility/2006" xmlns:p159="http://schemas.microsoft.com/office/powerpoint/2015/09/main">
+    <mc:Choice Requires="p159">
       <p:transition spd="slow">
         <p159:morph option="byObject"/>
       </p:transition>
     </mc:Choice>
-    <mc:Fallback>
+    <mc:Fallback xmlns="">
       <p:transition spd="slow">
         <p:fade/>
       </p:transition>
@@ -24043,13 +24599,13 @@
   <p:clrMapOvr>
     <a:masterClrMapping/>
   </p:clrMapOvr>
-  <mc:AlternateContent xmlns:mc="http://schemas.openxmlformats.org/markup-compatibility/2006">
-    <mc:Choice xmlns:p14="http://schemas.microsoft.com/office/powerpoint/2010/main" Requires="p14">
+  <mc:AlternateContent xmlns:mc="http://schemas.openxmlformats.org/markup-compatibility/2006" xmlns:p14="http://schemas.microsoft.com/office/powerpoint/2010/main">
+    <mc:Choice Requires="p14">
       <p:transition spd="med" p14:dur="700">
         <p:fade/>
       </p:transition>
     </mc:Choice>
-    <mc:Fallback>
+    <mc:Fallback xmlns="">
       <p:transition spd="med">
         <p:fade/>
       </p:transition>
@@ -25008,13 +25564,13 @@
   <p:clrMapOvr>
     <a:masterClrMapping/>
   </p:clrMapOvr>
-  <mc:AlternateContent xmlns:mc="http://schemas.openxmlformats.org/markup-compatibility/2006">
-    <mc:Choice xmlns:p14="http://schemas.microsoft.com/office/powerpoint/2010/main" Requires="p14">
+  <mc:AlternateContent xmlns:mc="http://schemas.openxmlformats.org/markup-compatibility/2006" xmlns:p14="http://schemas.microsoft.com/office/powerpoint/2010/main">
+    <mc:Choice Requires="p14">
       <p:transition spd="med" p14:dur="700">
         <p:fade/>
       </p:transition>
     </mc:Choice>
-    <mc:Fallback>
+    <mc:Fallback xmlns="">
       <p:transition spd="med">
         <p:fade/>
       </p:transition>
@@ -25614,15 +26170,6 @@
 </file>
 
 <file path=customXml/item1.xml><?xml version="1.0" encoding="utf-8"?>
-<?mso-contentType ?>
-<FormTemplates xmlns="http://schemas.microsoft.com/sharepoint/v3/contenttype/forms">
-  <Display>DocumentLibraryForm</Display>
-  <Edit>DocumentLibraryForm</Edit>
-  <New>DocumentLibraryForm</New>
-</FormTemplates>
-</file>
-
-<file path=customXml/item2.xml><?xml version="1.0" encoding="utf-8"?>
 <ct:contentTypeSchema xmlns:ct="http://schemas.microsoft.com/office/2006/metadata/contentType" xmlns:ma="http://schemas.microsoft.com/office/2006/metadata/properties/metaAttributes" ct:_="" ma:_="" ma:contentTypeName="Dokument" ma:contentTypeID="0x01010026AE99B019171B4595226F81BCBEDA2D" ma:contentTypeVersion="0" ma:contentTypeDescription="Ein neues Dokument erstellen." ma:contentTypeScope="" ma:versionID="91100f64a519b31780e8afb1074aad0f">
   <xsd:schema xmlns:xsd="http://www.w3.org/2001/XMLSchema" xmlns:xs="http://www.w3.org/2001/XMLSchema" xmlns:p="http://schemas.microsoft.com/office/2006/metadata/properties" targetNamespace="http://schemas.microsoft.com/office/2006/metadata/properties" ma:root="true" ma:fieldsID="189b9b1f19920f0e3f8d84e9eb84639d">
     <xsd:element name="properties">
@@ -25736,6 +26283,15 @@
 </ct:contentTypeSchema>
 </file>
 
+<file path=customXml/item2.xml><?xml version="1.0" encoding="utf-8"?>
+<?mso-contentType ?>
+<FormTemplates xmlns="http://schemas.microsoft.com/sharepoint/v3/contenttype/forms">
+  <Display>DocumentLibraryForm</Display>
+  <Edit>DocumentLibraryForm</Edit>
+  <New>DocumentLibraryForm</New>
+</FormTemplates>
+</file>
+
 <file path=customXml/item3.xml><?xml version="1.0" encoding="utf-8"?>
 <p:properties xmlns:p="http://schemas.microsoft.com/office/2006/metadata/properties" xmlns:xsi="http://www.w3.org/2001/XMLSchema-instance" xmlns:pc="http://schemas.microsoft.com/office/infopath/2007/PartnerControls">
   <documentManagement/>
@@ -25743,14 +26299,6 @@
 </file>
 
 <file path=customXml/itemProps1.xml><?xml version="1.0" encoding="utf-8"?>
-<ds:datastoreItem xmlns:ds="http://schemas.openxmlformats.org/officeDocument/2006/customXml" ds:itemID="{A23BD2AB-84D0-4BD5-BEF3-A236B576EF28}">
-  <ds:schemaRefs>
-    <ds:schemaRef ds:uri="http://schemas.microsoft.com/sharepoint/v3/contenttype/forms"/>
-  </ds:schemaRefs>
-</ds:datastoreItem>
-</file>
-
-<file path=customXml/itemProps2.xml><?xml version="1.0" encoding="utf-8"?>
 <ds:datastoreItem xmlns:ds="http://schemas.openxmlformats.org/officeDocument/2006/customXml" ds:itemID="{080F8127-BBDC-464B-8CD2-819CC22539C6}">
   <ds:schemaRefs>
     <ds:schemaRef ds:uri="http://purl.org/dc/elements/1.1/"/>
@@ -25762,6 +26310,14 @@
     <ds:schemaRef ds:uri="http://schemas.microsoft.com/office/infopath/2007/PartnerControls"/>
     <ds:schemaRef ds:uri="http://schemas.openxmlformats.org/package/2006/metadata/core-properties"/>
     <ds:schemaRef ds:uri="http://www.w3.org/2001/XMLSchema"/>
+  </ds:schemaRefs>
+</ds:datastoreItem>
+</file>
+
+<file path=customXml/itemProps2.xml><?xml version="1.0" encoding="utf-8"?>
+<ds:datastoreItem xmlns:ds="http://schemas.openxmlformats.org/officeDocument/2006/customXml" ds:itemID="{A23BD2AB-84D0-4BD5-BEF3-A236B576EF28}">
+  <ds:schemaRefs>
+    <ds:schemaRef ds:uri="http://schemas.microsoft.com/sharepoint/v3/contenttype/forms"/>
   </ds:schemaRefs>
 </ds:datastoreItem>
 </file>

</xml_diff>